<commit_message>
Modificaciones Reporte de monitoreo Abril
</commit_message>
<xml_diff>
--- a/qualtcom/Organizacional/Medicion y Monitoreo/Reporte Monitoreo-150430.pptx
+++ b/qualtcom/Organizacional/Medicion y Monitoreo/Reporte Monitoreo-150430.pptx
@@ -18,6 +18,7 @@
     <p:sldId id="267" r:id="rId12"/>
     <p:sldId id="269" r:id="rId13"/>
     <p:sldId id="268" r:id="rId14"/>
+    <p:sldId id="270" r:id="rId15"/>
   </p:sldIdLst>
   <p:sldSz cx="9144000" cy="6858000" type="screen4x3"/>
   <p:notesSz cx="7772400" cy="10058400"/>
@@ -211,7 +212,7 @@
                 <c:formatCode>_-"$"* #,##0.00_-;\-"$"* #,##0.00_-;_-"$"* "-"??_-;_-@_-</c:formatCode>
                 <c:ptCount val="2"/>
                 <c:pt idx="0">
-                  <c:v>11653</c:v>
+                  <c:v>9989</c:v>
                 </c:pt>
                 <c:pt idx="1">
                   <c:v>5693.7300000000005</c:v>
@@ -261,7 +262,7 @@
                 <c:formatCode>_-"$"* #,##0.00_-;\-"$"* #,##0.00_-;_-"$"* "-"??_-;_-@_-</c:formatCode>
                 <c:ptCount val="2"/>
                 <c:pt idx="0">
-                  <c:v>4979.0600000000004</c:v>
+                  <c:v>1914.52</c:v>
                 </c:pt>
                 <c:pt idx="1">
                   <c:v>1984.52</c:v>
@@ -284,11 +285,11 @@
           <c:showBubbleSize val="0"/>
         </c:dLbls>
         <c:gapWidth val="150"/>
-        <c:axId val="56407552"/>
-        <c:axId val="56408112"/>
+        <c:axId val="59498576"/>
+        <c:axId val="59499136"/>
       </c:barChart>
       <c:catAx>
-        <c:axId val="56407552"/>
+        <c:axId val="59498576"/>
         <c:scaling>
           <c:orientation val="minMax"/>
         </c:scaling>
@@ -298,7 +299,7 @@
         <c:majorTickMark val="none"/>
         <c:minorTickMark val="none"/>
         <c:tickLblPos val="nextTo"/>
-        <c:crossAx val="56408112"/>
+        <c:crossAx val="59499136"/>
         <c:crosses val="autoZero"/>
         <c:auto val="1"/>
         <c:lblAlgn val="ctr"/>
@@ -306,7 +307,7 @@
         <c:noMultiLvlLbl val="0"/>
       </c:catAx>
       <c:valAx>
-        <c:axId val="56408112"/>
+        <c:axId val="59499136"/>
         <c:scaling>
           <c:orientation val="minMax"/>
         </c:scaling>
@@ -317,7 +318,7 @@
         <c:majorTickMark val="none"/>
         <c:minorTickMark val="none"/>
         <c:tickLblPos val="nextTo"/>
-        <c:crossAx val="56407552"/>
+        <c:crossAx val="59498576"/>
         <c:crosses val="autoZero"/>
         <c:crossBetween val="between"/>
       </c:valAx>
@@ -413,7 +414,7 @@
                 <c:formatCode>0%</c:formatCode>
                 <c:ptCount val="2"/>
                 <c:pt idx="0">
-                  <c:v>0.57272290397322578</c:v>
+                  <c:v>0.80833717088797674</c:v>
                 </c:pt>
                 <c:pt idx="1">
                   <c:v>0.65145519720815703</c:v>
@@ -436,11 +437,11 @@
           <c:showBubbleSize val="0"/>
         </c:dLbls>
         <c:gapWidth val="150"/>
-        <c:axId val="139398800"/>
-        <c:axId val="139401040"/>
+        <c:axId val="59501376"/>
+        <c:axId val="59501936"/>
       </c:barChart>
       <c:catAx>
-        <c:axId val="139398800"/>
+        <c:axId val="59501376"/>
         <c:scaling>
           <c:orientation val="minMax"/>
         </c:scaling>
@@ -450,7 +451,7 @@
         <c:majorTickMark val="out"/>
         <c:minorTickMark val="none"/>
         <c:tickLblPos val="nextTo"/>
-        <c:crossAx val="139401040"/>
+        <c:crossAx val="59501936"/>
         <c:crosses val="autoZero"/>
         <c:auto val="1"/>
         <c:lblAlgn val="ctr"/>
@@ -458,7 +459,7 @@
         <c:noMultiLvlLbl val="0"/>
       </c:catAx>
       <c:valAx>
-        <c:axId val="139401040"/>
+        <c:axId val="59501936"/>
         <c:scaling>
           <c:orientation val="minMax"/>
           <c:max val="1"/>
@@ -471,7 +472,7 @@
         <c:majorTickMark val="out"/>
         <c:minorTickMark val="none"/>
         <c:tickLblPos val="nextTo"/>
-        <c:crossAx val="139398800"/>
+        <c:crossAx val="59501376"/>
         <c:crosses val="autoZero"/>
         <c:crossBetween val="between"/>
       </c:valAx>
@@ -516,7 +517,6 @@
           </a:p>
         </c:rich>
       </c:tx>
-      <c:layout/>
       <c:overlay val="0"/>
     </c:title>
     <c:autoTitleDeleted val="0"/>
@@ -587,10 +587,10 @@
                 <c:formatCode>General</c:formatCode>
                 <c:ptCount val="7"/>
                 <c:pt idx="0">
-                  <c:v>140</c:v>
+                  <c:v>91.2</c:v>
                 </c:pt>
                 <c:pt idx="1">
-                  <c:v>140</c:v>
+                  <c:v>45.6</c:v>
                 </c:pt>
                 <c:pt idx="2">
                   <c:v>45.600000000000009</c:v>
@@ -715,11 +715,11 @@
           <c:showBubbleSize val="0"/>
         </c:dLbls>
         <c:gapWidth val="150"/>
-        <c:axId val="195304880"/>
-        <c:axId val="195310480"/>
+        <c:axId val="101553296"/>
+        <c:axId val="101553856"/>
       </c:barChart>
       <c:catAx>
-        <c:axId val="195304880"/>
+        <c:axId val="101553296"/>
         <c:scaling>
           <c:orientation val="minMax"/>
         </c:scaling>
@@ -729,7 +729,7 @@
         <c:majorTickMark val="none"/>
         <c:minorTickMark val="none"/>
         <c:tickLblPos val="nextTo"/>
-        <c:crossAx val="195310480"/>
+        <c:crossAx val="101553856"/>
         <c:crosses val="autoZero"/>
         <c:auto val="1"/>
         <c:lblAlgn val="ctr"/>
@@ -737,7 +737,7 @@
         <c:noMultiLvlLbl val="0"/>
       </c:catAx>
       <c:valAx>
-        <c:axId val="195310480"/>
+        <c:axId val="101553856"/>
         <c:scaling>
           <c:orientation val="minMax"/>
         </c:scaling>
@@ -748,14 +748,13 @@
         <c:majorTickMark val="none"/>
         <c:minorTickMark val="none"/>
         <c:tickLblPos val="nextTo"/>
-        <c:crossAx val="195304880"/>
+        <c:crossAx val="101553296"/>
         <c:crosses val="autoZero"/>
         <c:crossBetween val="between"/>
       </c:valAx>
     </c:plotArea>
     <c:legend>
       <c:legendPos val="r"/>
-      <c:layout/>
       <c:overlay val="0"/>
     </c:legend>
     <c:plotVisOnly val="1"/>
@@ -798,7 +797,6 @@
           </a:p>
         </c:rich>
       </c:tx>
-      <c:layout/>
       <c:overlay val="0"/>
     </c:title>
     <c:autoTitleDeleted val="0"/>
@@ -879,10 +877,10 @@
                 <c:formatCode>0%</c:formatCode>
                 <c:ptCount val="7"/>
                 <c:pt idx="0">
-                  <c:v>0.76428571428571423</c:v>
+                  <c:v>0.63815789473684215</c:v>
                 </c:pt>
                 <c:pt idx="1">
-                  <c:v>0.90714285714285714</c:v>
+                  <c:v>0.71491228070175439</c:v>
                 </c:pt>
                 <c:pt idx="2">
                   <c:v>0.62719298245614041</c:v>
@@ -917,11 +915,11 @@
           <c:showBubbleSize val="0"/>
         </c:dLbls>
         <c:gapWidth val="150"/>
-        <c:axId val="183135104"/>
-        <c:axId val="183135664"/>
+        <c:axId val="101556096"/>
+        <c:axId val="101556656"/>
       </c:barChart>
       <c:catAx>
-        <c:axId val="183135104"/>
+        <c:axId val="101556096"/>
         <c:scaling>
           <c:orientation val="minMax"/>
         </c:scaling>
@@ -931,7 +929,7 @@
         <c:majorTickMark val="out"/>
         <c:minorTickMark val="none"/>
         <c:tickLblPos val="nextTo"/>
-        <c:crossAx val="183135664"/>
+        <c:crossAx val="101556656"/>
         <c:crosses val="autoZero"/>
         <c:auto val="1"/>
         <c:lblAlgn val="ctr"/>
@@ -939,7 +937,7 @@
         <c:noMultiLvlLbl val="0"/>
       </c:catAx>
       <c:valAx>
-        <c:axId val="183135664"/>
+        <c:axId val="101556656"/>
         <c:scaling>
           <c:orientation val="minMax"/>
           <c:max val="1"/>
@@ -952,7 +950,7 @@
         <c:majorTickMark val="out"/>
         <c:minorTickMark val="none"/>
         <c:tickLblPos val="nextTo"/>
-        <c:crossAx val="183135104"/>
+        <c:crossAx val="101556096"/>
         <c:crosses val="autoZero"/>
         <c:crossBetween val="between"/>
       </c:valAx>
@@ -997,7 +995,6 @@
           </a:p>
         </c:rich>
       </c:tx>
-      <c:layout/>
       <c:overlay val="0"/>
     </c:title>
     <c:autoTitleDeleted val="0"/>
@@ -1061,11 +1058,11 @@
           <c:showBubbleSize val="0"/>
         </c:dLbls>
         <c:gapWidth val="150"/>
-        <c:axId val="95627040"/>
-        <c:axId val="95627600"/>
+        <c:axId val="101990000"/>
+        <c:axId val="101990560"/>
       </c:barChart>
       <c:catAx>
-        <c:axId val="95627040"/>
+        <c:axId val="101990000"/>
         <c:scaling>
           <c:orientation val="minMax"/>
         </c:scaling>
@@ -1075,7 +1072,7 @@
         <c:majorTickMark val="none"/>
         <c:minorTickMark val="none"/>
         <c:tickLblPos val="nextTo"/>
-        <c:crossAx val="95627600"/>
+        <c:crossAx val="101990560"/>
         <c:crosses val="autoZero"/>
         <c:auto val="1"/>
         <c:lblAlgn val="ctr"/>
@@ -1083,7 +1080,7 @@
         <c:noMultiLvlLbl val="0"/>
       </c:catAx>
       <c:valAx>
-        <c:axId val="95627600"/>
+        <c:axId val="101990560"/>
         <c:scaling>
           <c:orientation val="minMax"/>
           <c:max val="1"/>
@@ -1095,7 +1092,7 @@
         <c:majorTickMark val="none"/>
         <c:minorTickMark val="none"/>
         <c:tickLblPos val="nextTo"/>
-        <c:crossAx val="95627040"/>
+        <c:crossAx val="101990000"/>
         <c:crosses val="autoZero"/>
         <c:crossBetween val="between"/>
       </c:valAx>
@@ -1146,7 +1143,6 @@
           </a:p>
         </c:rich>
       </c:tx>
-      <c:layout/>
       <c:overlay val="0"/>
     </c:title>
     <c:autoTitleDeleted val="0"/>
@@ -1210,11 +1206,11 @@
           <c:showBubbleSize val="0"/>
         </c:dLbls>
         <c:gapWidth val="150"/>
-        <c:axId val="95630400"/>
-        <c:axId val="95630960"/>
+        <c:axId val="101993360"/>
+        <c:axId val="101993920"/>
       </c:barChart>
       <c:catAx>
-        <c:axId val="95630400"/>
+        <c:axId val="101993360"/>
         <c:scaling>
           <c:orientation val="minMax"/>
         </c:scaling>
@@ -1224,7 +1220,7 @@
         <c:majorTickMark val="none"/>
         <c:minorTickMark val="none"/>
         <c:tickLblPos val="nextTo"/>
-        <c:crossAx val="95630960"/>
+        <c:crossAx val="101993920"/>
         <c:crosses val="autoZero"/>
         <c:auto val="1"/>
         <c:lblAlgn val="ctr"/>
@@ -1232,7 +1228,7 @@
         <c:noMultiLvlLbl val="0"/>
       </c:catAx>
       <c:valAx>
-        <c:axId val="95630960"/>
+        <c:axId val="101993920"/>
         <c:scaling>
           <c:orientation val="minMax"/>
           <c:max val="1"/>
@@ -1244,7 +1240,7 @@
         <c:majorTickMark val="none"/>
         <c:minorTickMark val="none"/>
         <c:tickLblPos val="nextTo"/>
-        <c:crossAx val="95630400"/>
+        <c:crossAx val="101993360"/>
         <c:crosses val="autoZero"/>
         <c:crossBetween val="between"/>
       </c:valAx>
@@ -1295,7 +1291,6 @@
           </a:p>
         </c:rich>
       </c:tx>
-      <c:layout/>
       <c:overlay val="0"/>
     </c:title>
     <c:autoTitleDeleted val="0"/>
@@ -1365,11 +1360,11 @@
           <c:showBubbleSize val="0"/>
         </c:dLbls>
         <c:gapWidth val="150"/>
-        <c:axId val="95633760"/>
-        <c:axId val="95073664"/>
+        <c:axId val="101996720"/>
+        <c:axId val="101997280"/>
       </c:barChart>
       <c:catAx>
-        <c:axId val="95633760"/>
+        <c:axId val="101996720"/>
         <c:scaling>
           <c:orientation val="minMax"/>
         </c:scaling>
@@ -1379,7 +1374,7 @@
         <c:majorTickMark val="none"/>
         <c:minorTickMark val="none"/>
         <c:tickLblPos val="nextTo"/>
-        <c:crossAx val="95073664"/>
+        <c:crossAx val="101997280"/>
         <c:crosses val="autoZero"/>
         <c:auto val="1"/>
         <c:lblAlgn val="ctr"/>
@@ -1387,7 +1382,7 @@
         <c:noMultiLvlLbl val="0"/>
       </c:catAx>
       <c:valAx>
-        <c:axId val="95073664"/>
+        <c:axId val="101997280"/>
         <c:scaling>
           <c:orientation val="minMax"/>
           <c:max val="1"/>
@@ -1399,7 +1394,7 @@
         <c:majorTickMark val="none"/>
         <c:minorTickMark val="none"/>
         <c:tickLblPos val="nextTo"/>
-        <c:crossAx val="95633760"/>
+        <c:crossAx val="101996720"/>
         <c:crosses val="autoZero"/>
         <c:crossBetween val="between"/>
       </c:valAx>
@@ -1450,7 +1445,6 @@
           </a:p>
         </c:rich>
       </c:tx>
-      <c:layout/>
       <c:overlay val="0"/>
     </c:title>
     <c:autoTitleDeleted val="0"/>
@@ -1514,11 +1508,11 @@
           <c:showBubbleSize val="0"/>
         </c:dLbls>
         <c:gapWidth val="150"/>
-        <c:axId val="95076464"/>
-        <c:axId val="95077024"/>
+        <c:axId val="101174944"/>
+        <c:axId val="101175504"/>
       </c:barChart>
       <c:catAx>
-        <c:axId val="95076464"/>
+        <c:axId val="101174944"/>
         <c:scaling>
           <c:orientation val="minMax"/>
         </c:scaling>
@@ -1528,7 +1522,7 @@
         <c:majorTickMark val="none"/>
         <c:minorTickMark val="none"/>
         <c:tickLblPos val="nextTo"/>
-        <c:crossAx val="95077024"/>
+        <c:crossAx val="101175504"/>
         <c:crosses val="autoZero"/>
         <c:auto val="1"/>
         <c:lblAlgn val="ctr"/>
@@ -1536,7 +1530,7 @@
         <c:noMultiLvlLbl val="0"/>
       </c:catAx>
       <c:valAx>
-        <c:axId val="95077024"/>
+        <c:axId val="101175504"/>
         <c:scaling>
           <c:orientation val="minMax"/>
         </c:scaling>
@@ -1547,7 +1541,7 @@
         <c:majorTickMark val="none"/>
         <c:minorTickMark val="none"/>
         <c:tickLblPos val="nextTo"/>
-        <c:crossAx val="95076464"/>
+        <c:crossAx val="101174944"/>
         <c:crosses val="autoZero"/>
         <c:crossBetween val="between"/>
       </c:valAx>
@@ -1603,7 +1597,6 @@
           </a:p>
         </c:rich>
       </c:tx>
-      <c:layout/>
       <c:overlay val="0"/>
     </c:title>
     <c:autoTitleDeleted val="0"/>
@@ -1769,11 +1762,11 @@
           <c:showBubbleSize val="0"/>
         </c:dLbls>
         <c:gapWidth val="150"/>
-        <c:axId val="225152912"/>
-        <c:axId val="225141152"/>
+        <c:axId val="101179424"/>
+        <c:axId val="101179984"/>
       </c:barChart>
       <c:catAx>
-        <c:axId val="225152912"/>
+        <c:axId val="101179424"/>
         <c:scaling>
           <c:orientation val="minMax"/>
         </c:scaling>
@@ -1783,7 +1776,7 @@
         <c:majorTickMark val="none"/>
         <c:minorTickMark val="none"/>
         <c:tickLblPos val="nextTo"/>
-        <c:crossAx val="225141152"/>
+        <c:crossAx val="101179984"/>
         <c:crosses val="autoZero"/>
         <c:auto val="1"/>
         <c:lblAlgn val="ctr"/>
@@ -1791,7 +1784,7 @@
         <c:noMultiLvlLbl val="0"/>
       </c:catAx>
       <c:valAx>
-        <c:axId val="225141152"/>
+        <c:axId val="101179984"/>
         <c:scaling>
           <c:orientation val="minMax"/>
           <c:max val="1"/>
@@ -1803,7 +1796,7 @@
         <c:majorTickMark val="none"/>
         <c:minorTickMark val="none"/>
         <c:tickLblPos val="nextTo"/>
-        <c:crossAx val="225152912"/>
+        <c:crossAx val="101179424"/>
         <c:crosses val="autoZero"/>
         <c:crossBetween val="between"/>
       </c:valAx>
@@ -4979,23 +4972,53 @@
           </a:p>
         </p:txBody>
       </p:sp>
+      <p:sp>
+        <p:nvSpPr>
+          <p:cNvPr id="5" name="CuadroTexto 4"/>
+          <p:cNvSpPr txBox="1"/>
+          <p:nvPr/>
+        </p:nvSpPr>
+        <p:spPr>
+          <a:xfrm>
+            <a:off x="457200" y="6021288"/>
+            <a:ext cx="8228160" cy="369332"/>
+          </a:xfrm>
+          <a:prstGeom prst="rect">
+            <a:avLst/>
+          </a:prstGeom>
+          <a:noFill/>
+        </p:spPr>
+        <p:txBody>
+          <a:bodyPr wrap="square" rtlCol="0">
+            <a:spAutoFit/>
+          </a:bodyPr>
+          <a:lstStyle/>
+          <a:p>
+            <a:r>
+              <a:rPr lang="es-MX" dirty="0" smtClean="0"/>
+              <a:t> </a:t>
+            </a:r>
+            <a:endParaRPr lang="es-MX" dirty="0"/>
+          </a:p>
+        </p:txBody>
+      </p:sp>
       <p:graphicFrame>
         <p:nvGraphicFramePr>
-          <p:cNvPr id="2" name="Tabla 1"/>
+          <p:cNvPr id="6" name="Tabla 5"/>
           <p:cNvGraphicFramePr>
             <a:graphicFrameLocks noGrp="1"/>
           </p:cNvGraphicFramePr>
           <p:nvPr>
             <p:extLst>
               <p:ext uri="{D42A27DB-BD31-4B8C-83A1-F6EECF244321}">
-                <p14:modId xmlns:p14="http://schemas.microsoft.com/office/powerpoint/2010/main" val="3258885907"/>
+                <p14:modId xmlns:p14="http://schemas.microsoft.com/office/powerpoint/2010/main" val="2225941180"/>
               </p:ext>
             </p:extLst>
           </p:nvPr>
         </p:nvGraphicFramePr>
         <p:xfrm>
-          <a:off x="648920" y="1700808"/>
-          <a:ext cx="8482861" cy="2311369"/>
+          <a:off x="457198" y="1308913"/>
+          <a:ext cx="8686802" cy="4654657"/>
         </p:xfrm>
         <a:graphic>
           <a:graphicData uri="http://schemas.openxmlformats.org/drawingml/2006/table">
@@ -5004,18 +5027,18 @@
                 <a:tableStyleId>{5C22544A-7EE6-4342-B048-85BDC9FD1C3A}</a:tableStyleId>
               </a:tblPr>
               <a:tblGrid>
-                <a:gridCol w="131287"/>
-                <a:gridCol w="1703561"/>
-                <a:gridCol w="432048"/>
-                <a:gridCol w="720080"/>
-                <a:gridCol w="576064"/>
-                <a:gridCol w="576064"/>
-                <a:gridCol w="1512168"/>
-                <a:gridCol w="1679462"/>
-                <a:gridCol w="696802"/>
-                <a:gridCol w="455325"/>
+                <a:gridCol w="135335"/>
+                <a:gridCol w="1581725"/>
+                <a:gridCol w="634382"/>
+                <a:gridCol w="634382"/>
+                <a:gridCol w="634382"/>
+                <a:gridCol w="634382"/>
+                <a:gridCol w="1581725"/>
+                <a:gridCol w="1581725"/>
+                <a:gridCol w="634382"/>
+                <a:gridCol w="634382"/>
               </a:tblGrid>
-              <a:tr h="360040">
+              <a:tr h="253337">
                 <a:tc>
                   <a:txBody>
                     <a:bodyPr/>
@@ -5069,12 +5092,12 @@
                     <a:p>
                       <a:pPr algn="ctr" fontAlgn="ctr"/>
                       <a:r>
-                        <a:rPr lang="es-MX" sz="700" u="none" strike="noStrike" dirty="0">
+                        <a:rPr lang="es-MX" sz="700" u="none" strike="noStrike">
                           <a:effectLst/>
                         </a:rPr>
                         <a:t>IMPACTO</a:t>
                       </a:r>
-                      <a:endParaRPr lang="es-MX" sz="700" b="1" i="0" u="none" strike="noStrike" dirty="0">
+                      <a:endParaRPr lang="es-MX" sz="700" b="1" i="0" u="none" strike="noStrike">
                         <a:solidFill>
                           <a:srgbClr val="000000"/>
                         </a:solidFill>
@@ -5247,7 +5270,7 @@
                   <a:tcPr marL="0" marR="0" marT="0" marB="0" anchor="ctr"/>
                 </a:tc>
               </a:tr>
-              <a:tr h="1170797">
+              <a:tr h="837327">
                 <a:tc>
                   <a:txBody>
                     <a:bodyPr/>
@@ -5476,6 +5499,1398 @@
                         <a:rPr lang="es-MX" sz="700" u="none" strike="noStrike">
                           <a:effectLst/>
                         </a:rPr>
+                        <a:t>Mitigado</a:t>
+                      </a:r>
+                      <a:endParaRPr lang="es-MX" sz="700" b="0" i="0" u="none" strike="noStrike">
+                        <a:solidFill>
+                          <a:srgbClr val="000000"/>
+                        </a:solidFill>
+                        <a:effectLst/>
+                        <a:latin typeface="Calibri" panose="020F0502020204030204" pitchFamily="34" charset="0"/>
+                      </a:endParaRPr>
+                    </a:p>
+                  </a:txBody>
+                  <a:tcPr marL="0" marR="0" marT="0" marB="0" anchor="ctr"/>
+                </a:tc>
+              </a:tr>
+              <a:tr h="633345">
+                <a:tc>
+                  <a:txBody>
+                    <a:bodyPr/>
+                    <a:lstStyle/>
+                    <a:p>
+                      <a:pPr algn="ctr" fontAlgn="ctr"/>
+                      <a:r>
+                        <a:rPr lang="es-MX" sz="700" u="none" strike="noStrike">
+                          <a:effectLst/>
+                        </a:rPr>
+                        <a:t>2</a:t>
+                      </a:r>
+                      <a:endParaRPr lang="es-MX" sz="700" b="0" i="0" u="none" strike="noStrike">
+                        <a:solidFill>
+                          <a:srgbClr val="000000"/>
+                        </a:solidFill>
+                        <a:effectLst/>
+                        <a:latin typeface="Calibri" panose="020F0502020204030204" pitchFamily="34" charset="0"/>
+                      </a:endParaRPr>
+                    </a:p>
+                  </a:txBody>
+                  <a:tcPr marL="0" marR="0" marT="0" marB="0" anchor="ctr"/>
+                </a:tc>
+                <a:tc>
+                  <a:txBody>
+                    <a:bodyPr/>
+                    <a:lstStyle/>
+                    <a:p>
+                      <a:pPr algn="l" fontAlgn="t"/>
+                      <a:r>
+                        <a:rPr lang="es-ES" sz="700" u="none" strike="noStrike">
+                          <a:effectLst/>
+                        </a:rPr>
+                        <a:t>Si no se tiene el personal para la entrega del servicio calificado, la entrega del  podrían ser deficientes y no se lograría una entrega de calidad</a:t>
+                      </a:r>
+                      <a:endParaRPr lang="es-ES" sz="700" b="0" i="0" u="none" strike="noStrike">
+                        <a:solidFill>
+                          <a:srgbClr val="000000"/>
+                        </a:solidFill>
+                        <a:effectLst/>
+                        <a:latin typeface="Calibri" panose="020F0502020204030204" pitchFamily="34" charset="0"/>
+                      </a:endParaRPr>
+                    </a:p>
+                  </a:txBody>
+                  <a:tcPr marL="0" marR="0" marT="0" marB="0"/>
+                </a:tc>
+                <a:tc>
+                  <a:txBody>
+                    <a:bodyPr/>
+                    <a:lstStyle/>
+                    <a:p>
+                      <a:pPr algn="ctr" fontAlgn="ctr"/>
+                      <a:r>
+                        <a:rPr lang="es-MX" sz="700" u="none" strike="noStrike">
+                          <a:effectLst/>
+                        </a:rPr>
+                        <a:t>5</a:t>
+                      </a:r>
+                      <a:endParaRPr lang="es-MX" sz="700" b="0" i="0" u="none" strike="noStrike">
+                        <a:solidFill>
+                          <a:srgbClr val="000000"/>
+                        </a:solidFill>
+                        <a:effectLst/>
+                        <a:latin typeface="Calibri" panose="020F0502020204030204" pitchFamily="34" charset="0"/>
+                      </a:endParaRPr>
+                    </a:p>
+                  </a:txBody>
+                  <a:tcPr marL="0" marR="0" marT="0" marB="0" anchor="ctr"/>
+                </a:tc>
+                <a:tc>
+                  <a:txBody>
+                    <a:bodyPr/>
+                    <a:lstStyle/>
+                    <a:p>
+                      <a:pPr algn="ctr" fontAlgn="ctr"/>
+                      <a:r>
+                        <a:rPr lang="es-MX" sz="700" u="none" strike="noStrike">
+                          <a:effectLst/>
+                        </a:rPr>
+                        <a:t>30%</a:t>
+                      </a:r>
+                      <a:endParaRPr lang="es-MX" sz="700" b="0" i="0" u="none" strike="noStrike">
+                        <a:solidFill>
+                          <a:srgbClr val="000000"/>
+                        </a:solidFill>
+                        <a:effectLst/>
+                        <a:latin typeface="Calibri" panose="020F0502020204030204" pitchFamily="34" charset="0"/>
+                      </a:endParaRPr>
+                    </a:p>
+                  </a:txBody>
+                  <a:tcPr marL="0" marR="0" marT="0" marB="0" anchor="ctr"/>
+                </a:tc>
+                <a:tc>
+                  <a:txBody>
+                    <a:bodyPr/>
+                    <a:lstStyle/>
+                    <a:p>
+                      <a:pPr algn="ctr" fontAlgn="ctr"/>
+                      <a:r>
+                        <a:rPr lang="es-MX" sz="700" u="none" strike="noStrike">
+                          <a:effectLst/>
+                        </a:rPr>
+                        <a:t>1,5</a:t>
+                      </a:r>
+                      <a:endParaRPr lang="es-MX" sz="700" b="0" i="0" u="none" strike="noStrike">
+                        <a:solidFill>
+                          <a:srgbClr val="000000"/>
+                        </a:solidFill>
+                        <a:effectLst/>
+                        <a:latin typeface="Calibri" panose="020F0502020204030204" pitchFamily="34" charset="0"/>
+                      </a:endParaRPr>
+                    </a:p>
+                  </a:txBody>
+                  <a:tcPr marL="0" marR="0" marT="0" marB="0" anchor="ctr"/>
+                </a:tc>
+                <a:tc>
+                  <a:txBody>
+                    <a:bodyPr/>
+                    <a:lstStyle/>
+                    <a:p>
+                      <a:pPr algn="ctr" fontAlgn="ctr"/>
+                      <a:r>
+                        <a:rPr lang="es-MX" sz="700" u="none" strike="noStrike">
+                          <a:effectLst/>
+                        </a:rPr>
+                        <a:t>1</a:t>
+                      </a:r>
+                      <a:endParaRPr lang="es-MX" sz="700" b="0" i="0" u="none" strike="noStrike">
+                        <a:solidFill>
+                          <a:srgbClr val="000000"/>
+                        </a:solidFill>
+                        <a:effectLst/>
+                        <a:latin typeface="Calibri" panose="020F0502020204030204" pitchFamily="34" charset="0"/>
+                      </a:endParaRPr>
+                    </a:p>
+                  </a:txBody>
+                  <a:tcPr marL="0" marR="0" marT="0" marB="0" anchor="ctr"/>
+                </a:tc>
+                <a:tc>
+                  <a:txBody>
+                    <a:bodyPr/>
+                    <a:lstStyle/>
+                    <a:p>
+                      <a:pPr algn="l" fontAlgn="ctr"/>
+                      <a:r>
+                        <a:rPr lang="es-ES" sz="700" u="none" strike="noStrike">
+                          <a:effectLst/>
+                        </a:rPr>
+                        <a:t>Generar un plan de capacitación para incrementar las habilidades del personal</a:t>
+                      </a:r>
+                      <a:endParaRPr lang="es-ES" sz="700" b="0" i="0" u="none" strike="noStrike">
+                        <a:solidFill>
+                          <a:srgbClr val="000000"/>
+                        </a:solidFill>
+                        <a:effectLst/>
+                        <a:latin typeface="Calibri" panose="020F0502020204030204" pitchFamily="34" charset="0"/>
+                      </a:endParaRPr>
+                    </a:p>
+                  </a:txBody>
+                  <a:tcPr marL="0" marR="0" marT="0" marB="0" anchor="ctr"/>
+                </a:tc>
+                <a:tc>
+                  <a:txBody>
+                    <a:bodyPr/>
+                    <a:lstStyle/>
+                    <a:p>
+                      <a:pPr algn="l" fontAlgn="ctr"/>
+                      <a:r>
+                        <a:rPr lang="es-ES" sz="700" u="none" strike="noStrike">
+                          <a:effectLst/>
+                        </a:rPr>
+                        <a:t>Contratar personal experto en los servicios que ofrece la empresa</a:t>
+                      </a:r>
+                      <a:endParaRPr lang="es-ES" sz="700" b="0" i="0" u="none" strike="noStrike">
+                        <a:solidFill>
+                          <a:srgbClr val="000000"/>
+                        </a:solidFill>
+                        <a:effectLst/>
+                        <a:latin typeface="Calibri" panose="020F0502020204030204" pitchFamily="34" charset="0"/>
+                      </a:endParaRPr>
+                    </a:p>
+                  </a:txBody>
+                  <a:tcPr marL="0" marR="0" marT="0" marB="0" anchor="ctr"/>
+                </a:tc>
+                <a:tc>
+                  <a:txBody>
+                    <a:bodyPr/>
+                    <a:lstStyle/>
+                    <a:p>
+                      <a:pPr algn="ctr" fontAlgn="ctr"/>
+                      <a:r>
+                        <a:rPr lang="es-MX" sz="700" u="none" strike="noStrike">
+                          <a:effectLst/>
+                        </a:rPr>
+                        <a:t>Jovanny Zepeda</a:t>
+                      </a:r>
+                      <a:endParaRPr lang="es-MX" sz="700" b="0" i="0" u="none" strike="noStrike">
+                        <a:solidFill>
+                          <a:srgbClr val="000000"/>
+                        </a:solidFill>
+                        <a:effectLst/>
+                        <a:latin typeface="Calibri" panose="020F0502020204030204" pitchFamily="34" charset="0"/>
+                      </a:endParaRPr>
+                    </a:p>
+                  </a:txBody>
+                  <a:tcPr marL="0" marR="0" marT="0" marB="0" anchor="ctr"/>
+                </a:tc>
+                <a:tc>
+                  <a:txBody>
+                    <a:bodyPr/>
+                    <a:lstStyle/>
+                    <a:p>
+                      <a:pPr algn="ctr" fontAlgn="ctr"/>
+                      <a:r>
+                        <a:rPr lang="es-MX" sz="700" u="none" strike="noStrike">
+                          <a:effectLst/>
+                        </a:rPr>
+                        <a:t>Mitigado</a:t>
+                      </a:r>
+                      <a:endParaRPr lang="es-MX" sz="700" b="0" i="0" u="none" strike="noStrike">
+                        <a:solidFill>
+                          <a:srgbClr val="000000"/>
+                        </a:solidFill>
+                        <a:effectLst/>
+                        <a:latin typeface="Calibri" panose="020F0502020204030204" pitchFamily="34" charset="0"/>
+                      </a:endParaRPr>
+                    </a:p>
+                  </a:txBody>
+                  <a:tcPr marL="0" marR="0" marT="0" marB="0" anchor="ctr"/>
+                </a:tc>
+              </a:tr>
+              <a:tr h="418664">
+                <a:tc>
+                  <a:txBody>
+                    <a:bodyPr/>
+                    <a:lstStyle/>
+                    <a:p>
+                      <a:pPr algn="ctr" fontAlgn="ctr"/>
+                      <a:r>
+                        <a:rPr lang="es-MX" sz="700" u="none" strike="noStrike">
+                          <a:effectLst/>
+                        </a:rPr>
+                        <a:t>3</a:t>
+                      </a:r>
+                      <a:endParaRPr lang="es-MX" sz="700" b="0" i="0" u="none" strike="noStrike">
+                        <a:solidFill>
+                          <a:srgbClr val="000000"/>
+                        </a:solidFill>
+                        <a:effectLst/>
+                        <a:latin typeface="Calibri" panose="020F0502020204030204" pitchFamily="34" charset="0"/>
+                      </a:endParaRPr>
+                    </a:p>
+                  </a:txBody>
+                  <a:tcPr marL="0" marR="0" marT="0" marB="0" anchor="ctr"/>
+                </a:tc>
+                <a:tc>
+                  <a:txBody>
+                    <a:bodyPr/>
+                    <a:lstStyle/>
+                    <a:p>
+                      <a:pPr algn="l" fontAlgn="t"/>
+                      <a:r>
+                        <a:rPr lang="es-ES" sz="700" u="none" strike="noStrike">
+                          <a:effectLst/>
+                        </a:rPr>
+                        <a:t>Perdida de Servidor por falla en el equipo o siniestro natural</a:t>
+                      </a:r>
+                      <a:endParaRPr lang="es-ES" sz="700" b="0" i="0" u="none" strike="noStrike">
+                        <a:solidFill>
+                          <a:srgbClr val="000000"/>
+                        </a:solidFill>
+                        <a:effectLst/>
+                        <a:latin typeface="Calibri" panose="020F0502020204030204" pitchFamily="34" charset="0"/>
+                      </a:endParaRPr>
+                    </a:p>
+                  </a:txBody>
+                  <a:tcPr marL="0" marR="0" marT="0" marB="0"/>
+                </a:tc>
+                <a:tc>
+                  <a:txBody>
+                    <a:bodyPr/>
+                    <a:lstStyle/>
+                    <a:p>
+                      <a:pPr algn="ctr" fontAlgn="ctr"/>
+                      <a:r>
+                        <a:rPr lang="es-MX" sz="700" u="none" strike="noStrike">
+                          <a:effectLst/>
+                        </a:rPr>
+                        <a:t>5</a:t>
+                      </a:r>
+                      <a:endParaRPr lang="es-MX" sz="700" b="0" i="0" u="none" strike="noStrike">
+                        <a:solidFill>
+                          <a:srgbClr val="000000"/>
+                        </a:solidFill>
+                        <a:effectLst/>
+                        <a:latin typeface="Calibri" panose="020F0502020204030204" pitchFamily="34" charset="0"/>
+                      </a:endParaRPr>
+                    </a:p>
+                  </a:txBody>
+                  <a:tcPr marL="0" marR="0" marT="0" marB="0" anchor="ctr"/>
+                </a:tc>
+                <a:tc>
+                  <a:txBody>
+                    <a:bodyPr/>
+                    <a:lstStyle/>
+                    <a:p>
+                      <a:pPr algn="ctr" fontAlgn="ctr"/>
+                      <a:r>
+                        <a:rPr lang="es-MX" sz="700" u="none" strike="noStrike">
+                          <a:effectLst/>
+                        </a:rPr>
+                        <a:t>20%</a:t>
+                      </a:r>
+                      <a:endParaRPr lang="es-MX" sz="700" b="0" i="0" u="none" strike="noStrike">
+                        <a:solidFill>
+                          <a:srgbClr val="000000"/>
+                        </a:solidFill>
+                        <a:effectLst/>
+                        <a:latin typeface="Calibri" panose="020F0502020204030204" pitchFamily="34" charset="0"/>
+                      </a:endParaRPr>
+                    </a:p>
+                  </a:txBody>
+                  <a:tcPr marL="0" marR="0" marT="0" marB="0" anchor="ctr"/>
+                </a:tc>
+                <a:tc>
+                  <a:txBody>
+                    <a:bodyPr/>
+                    <a:lstStyle/>
+                    <a:p>
+                      <a:pPr algn="ctr" fontAlgn="ctr"/>
+                      <a:r>
+                        <a:rPr lang="es-MX" sz="700" u="none" strike="noStrike">
+                          <a:effectLst/>
+                        </a:rPr>
+                        <a:t>1</a:t>
+                      </a:r>
+                      <a:endParaRPr lang="es-MX" sz="700" b="0" i="0" u="none" strike="noStrike">
+                        <a:solidFill>
+                          <a:srgbClr val="000000"/>
+                        </a:solidFill>
+                        <a:effectLst/>
+                        <a:latin typeface="Calibri" panose="020F0502020204030204" pitchFamily="34" charset="0"/>
+                      </a:endParaRPr>
+                    </a:p>
+                  </a:txBody>
+                  <a:tcPr marL="0" marR="0" marT="0" marB="0" anchor="ctr"/>
+                </a:tc>
+                <a:tc>
+                  <a:txBody>
+                    <a:bodyPr/>
+                    <a:lstStyle/>
+                    <a:p>
+                      <a:pPr algn="ctr" fontAlgn="ctr"/>
+                      <a:r>
+                        <a:rPr lang="es-MX" sz="700" u="none" strike="noStrike">
+                          <a:effectLst/>
+                        </a:rPr>
+                        <a:t>1</a:t>
+                      </a:r>
+                      <a:endParaRPr lang="es-MX" sz="700" b="0" i="0" u="none" strike="noStrike">
+                        <a:solidFill>
+                          <a:srgbClr val="000000"/>
+                        </a:solidFill>
+                        <a:effectLst/>
+                        <a:latin typeface="Calibri" panose="020F0502020204030204" pitchFamily="34" charset="0"/>
+                      </a:endParaRPr>
+                    </a:p>
+                  </a:txBody>
+                  <a:tcPr marL="0" marR="0" marT="0" marB="0" anchor="ctr"/>
+                </a:tc>
+                <a:tc>
+                  <a:txBody>
+                    <a:bodyPr/>
+                    <a:lstStyle/>
+                    <a:p>
+                      <a:pPr algn="l" fontAlgn="t"/>
+                      <a:r>
+                        <a:rPr lang="es-ES" sz="700" u="none" strike="noStrike">
+                          <a:effectLst/>
+                        </a:rPr>
+                        <a:t>Generar respaldos preventivos con toda la informacion en un lugar diferente al ordenador </a:t>
+                      </a:r>
+                      <a:endParaRPr lang="es-ES" sz="700" b="0" i="0" u="none" strike="noStrike">
+                        <a:solidFill>
+                          <a:srgbClr val="000000"/>
+                        </a:solidFill>
+                        <a:effectLst/>
+                        <a:latin typeface="Calibri" panose="020F0502020204030204" pitchFamily="34" charset="0"/>
+                      </a:endParaRPr>
+                    </a:p>
+                  </a:txBody>
+                  <a:tcPr marL="0" marR="0" marT="0" marB="0"/>
+                </a:tc>
+                <a:tc>
+                  <a:txBody>
+                    <a:bodyPr/>
+                    <a:lstStyle/>
+                    <a:p>
+                      <a:pPr algn="l" fontAlgn="t"/>
+                      <a:r>
+                        <a:rPr lang="es-ES" sz="700" u="none" strike="noStrike">
+                          <a:effectLst/>
+                        </a:rPr>
+                        <a:t>Reinstalar servicio en un servidor distinto</a:t>
+                      </a:r>
+                      <a:endParaRPr lang="es-ES" sz="700" b="0" i="0" u="none" strike="noStrike">
+                        <a:solidFill>
+                          <a:srgbClr val="000000"/>
+                        </a:solidFill>
+                        <a:effectLst/>
+                        <a:latin typeface="Calibri" panose="020F0502020204030204" pitchFamily="34" charset="0"/>
+                      </a:endParaRPr>
+                    </a:p>
+                  </a:txBody>
+                  <a:tcPr marL="0" marR="0" marT="0" marB="0"/>
+                </a:tc>
+                <a:tc>
+                  <a:txBody>
+                    <a:bodyPr/>
+                    <a:lstStyle/>
+                    <a:p>
+                      <a:pPr algn="ctr" fontAlgn="ctr"/>
+                      <a:r>
+                        <a:rPr lang="es-MX" sz="700" u="none" strike="noStrike">
+                          <a:effectLst/>
+                        </a:rPr>
+                        <a:t>Jovanny Zepeda</a:t>
+                      </a:r>
+                      <a:endParaRPr lang="es-MX" sz="700" b="0" i="0" u="none" strike="noStrike">
+                        <a:solidFill>
+                          <a:srgbClr val="000000"/>
+                        </a:solidFill>
+                        <a:effectLst/>
+                        <a:latin typeface="Calibri" panose="020F0502020204030204" pitchFamily="34" charset="0"/>
+                      </a:endParaRPr>
+                    </a:p>
+                  </a:txBody>
+                  <a:tcPr marL="0" marR="0" marT="0" marB="0" anchor="ctr"/>
+                </a:tc>
+                <a:tc>
+                  <a:txBody>
+                    <a:bodyPr/>
+                    <a:lstStyle/>
+                    <a:p>
+                      <a:pPr algn="ctr" fontAlgn="ctr"/>
+                      <a:r>
+                        <a:rPr lang="es-MX" sz="700" u="none" strike="noStrike">
+                          <a:effectLst/>
+                        </a:rPr>
+                        <a:t>Mitigado</a:t>
+                      </a:r>
+                      <a:endParaRPr lang="es-MX" sz="700" b="0" i="0" u="none" strike="noStrike">
+                        <a:solidFill>
+                          <a:srgbClr val="000000"/>
+                        </a:solidFill>
+                        <a:effectLst/>
+                        <a:latin typeface="Calibri" panose="020F0502020204030204" pitchFamily="34" charset="0"/>
+                      </a:endParaRPr>
+                    </a:p>
+                  </a:txBody>
+                  <a:tcPr marL="0" marR="0" marT="0" marB="0" anchor="ctr"/>
+                </a:tc>
+              </a:tr>
+              <a:tr h="418664">
+                <a:tc>
+                  <a:txBody>
+                    <a:bodyPr/>
+                    <a:lstStyle/>
+                    <a:p>
+                      <a:pPr algn="ctr" fontAlgn="ctr"/>
+                      <a:r>
+                        <a:rPr lang="es-MX" sz="700" u="none" strike="noStrike">
+                          <a:effectLst/>
+                        </a:rPr>
+                        <a:t>4</a:t>
+                      </a:r>
+                      <a:endParaRPr lang="es-MX" sz="700" b="0" i="0" u="none" strike="noStrike">
+                        <a:solidFill>
+                          <a:srgbClr val="000000"/>
+                        </a:solidFill>
+                        <a:effectLst/>
+                        <a:latin typeface="Calibri" panose="020F0502020204030204" pitchFamily="34" charset="0"/>
+                      </a:endParaRPr>
+                    </a:p>
+                  </a:txBody>
+                  <a:tcPr marL="0" marR="0" marT="0" marB="0" anchor="ctr"/>
+                </a:tc>
+                <a:tc>
+                  <a:txBody>
+                    <a:bodyPr/>
+                    <a:lstStyle/>
+                    <a:p>
+                      <a:pPr algn="l" fontAlgn="t"/>
+                      <a:r>
+                        <a:rPr lang="es-ES" sz="700" u="none" strike="noStrike">
+                          <a:effectLst/>
+                        </a:rPr>
+                        <a:t>Desviaciones elevadas a causa de pocos clientes</a:t>
+                      </a:r>
+                      <a:endParaRPr lang="es-ES" sz="700" b="0" i="0" u="none" strike="noStrike">
+                        <a:solidFill>
+                          <a:srgbClr val="000000"/>
+                        </a:solidFill>
+                        <a:effectLst/>
+                        <a:latin typeface="Calibri" panose="020F0502020204030204" pitchFamily="34" charset="0"/>
+                      </a:endParaRPr>
+                    </a:p>
+                  </a:txBody>
+                  <a:tcPr marL="0" marR="0" marT="0" marB="0"/>
+                </a:tc>
+                <a:tc>
+                  <a:txBody>
+                    <a:bodyPr/>
+                    <a:lstStyle/>
+                    <a:p>
+                      <a:pPr algn="ctr" fontAlgn="ctr"/>
+                      <a:r>
+                        <a:rPr lang="es-MX" sz="700" u="none" strike="noStrike">
+                          <a:effectLst/>
+                        </a:rPr>
+                        <a:t>2</a:t>
+                      </a:r>
+                      <a:endParaRPr lang="es-MX" sz="700" b="0" i="0" u="none" strike="noStrike">
+                        <a:solidFill>
+                          <a:srgbClr val="000000"/>
+                        </a:solidFill>
+                        <a:effectLst/>
+                        <a:latin typeface="Calibri" panose="020F0502020204030204" pitchFamily="34" charset="0"/>
+                      </a:endParaRPr>
+                    </a:p>
+                  </a:txBody>
+                  <a:tcPr marL="0" marR="0" marT="0" marB="0" anchor="ctr"/>
+                </a:tc>
+                <a:tc>
+                  <a:txBody>
+                    <a:bodyPr/>
+                    <a:lstStyle/>
+                    <a:p>
+                      <a:pPr algn="ctr" fontAlgn="ctr"/>
+                      <a:r>
+                        <a:rPr lang="es-MX" sz="700" u="none" strike="noStrike">
+                          <a:effectLst/>
+                        </a:rPr>
+                        <a:t>65%</a:t>
+                      </a:r>
+                      <a:endParaRPr lang="es-MX" sz="700" b="0" i="0" u="none" strike="noStrike">
+                        <a:solidFill>
+                          <a:srgbClr val="000000"/>
+                        </a:solidFill>
+                        <a:effectLst/>
+                        <a:latin typeface="Calibri" panose="020F0502020204030204" pitchFamily="34" charset="0"/>
+                      </a:endParaRPr>
+                    </a:p>
+                  </a:txBody>
+                  <a:tcPr marL="0" marR="0" marT="0" marB="0" anchor="ctr"/>
+                </a:tc>
+                <a:tc>
+                  <a:txBody>
+                    <a:bodyPr/>
+                    <a:lstStyle/>
+                    <a:p>
+                      <a:pPr algn="ctr" fontAlgn="ctr"/>
+                      <a:r>
+                        <a:rPr lang="es-MX" sz="700" u="none" strike="noStrike">
+                          <a:effectLst/>
+                        </a:rPr>
+                        <a:t>1,3</a:t>
+                      </a:r>
+                      <a:endParaRPr lang="es-MX" sz="700" b="0" i="0" u="none" strike="noStrike">
+                        <a:solidFill>
+                          <a:srgbClr val="000000"/>
+                        </a:solidFill>
+                        <a:effectLst/>
+                        <a:latin typeface="Calibri" panose="020F0502020204030204" pitchFamily="34" charset="0"/>
+                      </a:endParaRPr>
+                    </a:p>
+                  </a:txBody>
+                  <a:tcPr marL="0" marR="0" marT="0" marB="0" anchor="ctr"/>
+                </a:tc>
+                <a:tc>
+                  <a:txBody>
+                    <a:bodyPr/>
+                    <a:lstStyle/>
+                    <a:p>
+                      <a:pPr algn="ctr" fontAlgn="ctr"/>
+                      <a:r>
+                        <a:rPr lang="es-MX" sz="700" u="none" strike="noStrike">
+                          <a:effectLst/>
+                        </a:rPr>
+                        <a:t>3</a:t>
+                      </a:r>
+                      <a:endParaRPr lang="es-MX" sz="700" b="0" i="0" u="none" strike="noStrike">
+                        <a:solidFill>
+                          <a:srgbClr val="000000"/>
+                        </a:solidFill>
+                        <a:effectLst/>
+                        <a:latin typeface="Calibri" panose="020F0502020204030204" pitchFamily="34" charset="0"/>
+                      </a:endParaRPr>
+                    </a:p>
+                  </a:txBody>
+                  <a:tcPr marL="0" marR="0" marT="0" marB="0" anchor="ctr"/>
+                </a:tc>
+                <a:tc>
+                  <a:txBody>
+                    <a:bodyPr/>
+                    <a:lstStyle/>
+                    <a:p>
+                      <a:pPr algn="l" fontAlgn="t"/>
+                      <a:r>
+                        <a:rPr lang="es-ES" sz="700" u="none" strike="noStrike">
+                          <a:effectLst/>
+                        </a:rPr>
+                        <a:t>Generar servicio adecuado para que los clientes comiencen a recomendar los servicios otorgados</a:t>
+                      </a:r>
+                      <a:endParaRPr lang="es-ES" sz="700" b="0" i="0" u="none" strike="noStrike">
+                        <a:solidFill>
+                          <a:srgbClr val="000000"/>
+                        </a:solidFill>
+                        <a:effectLst/>
+                        <a:latin typeface="Calibri" panose="020F0502020204030204" pitchFamily="34" charset="0"/>
+                      </a:endParaRPr>
+                    </a:p>
+                  </a:txBody>
+                  <a:tcPr marL="0" marR="0" marT="0" marB="0"/>
+                </a:tc>
+                <a:tc>
+                  <a:txBody>
+                    <a:bodyPr/>
+                    <a:lstStyle/>
+                    <a:p>
+                      <a:pPr algn="l" fontAlgn="t"/>
+                      <a:r>
+                        <a:rPr lang="es-ES" sz="700" u="none" strike="noStrike">
+                          <a:effectLst/>
+                        </a:rPr>
+                        <a:t>Buscar mas clientes para poder invertir mas tiempo del planeado en la ejecucion</a:t>
+                      </a:r>
+                      <a:endParaRPr lang="es-ES" sz="700" b="0" i="0" u="none" strike="noStrike">
+                        <a:solidFill>
+                          <a:srgbClr val="000000"/>
+                        </a:solidFill>
+                        <a:effectLst/>
+                        <a:latin typeface="Calibri" panose="020F0502020204030204" pitchFamily="34" charset="0"/>
+                      </a:endParaRPr>
+                    </a:p>
+                  </a:txBody>
+                  <a:tcPr marL="0" marR="0" marT="0" marB="0"/>
+                </a:tc>
+                <a:tc>
+                  <a:txBody>
+                    <a:bodyPr/>
+                    <a:lstStyle/>
+                    <a:p>
+                      <a:pPr algn="ctr" fontAlgn="ctr"/>
+                      <a:r>
+                        <a:rPr lang="es-MX" sz="700" u="none" strike="noStrike">
+                          <a:effectLst/>
+                        </a:rPr>
+                        <a:t>Fidel Reyna</a:t>
+                      </a:r>
+                      <a:endParaRPr lang="es-MX" sz="700" b="0" i="0" u="none" strike="noStrike">
+                        <a:solidFill>
+                          <a:srgbClr val="000000"/>
+                        </a:solidFill>
+                        <a:effectLst/>
+                        <a:latin typeface="Calibri" panose="020F0502020204030204" pitchFamily="34" charset="0"/>
+                      </a:endParaRPr>
+                    </a:p>
+                  </a:txBody>
+                  <a:tcPr marL="0" marR="0" marT="0" marB="0" anchor="ctr"/>
+                </a:tc>
+                <a:tc>
+                  <a:txBody>
+                    <a:bodyPr/>
+                    <a:lstStyle/>
+                    <a:p>
+                      <a:pPr algn="ctr" fontAlgn="ctr"/>
+                      <a:r>
+                        <a:rPr lang="es-MX" sz="700" u="none" strike="noStrike">
+                          <a:effectLst/>
+                        </a:rPr>
+                        <a:t>Ocurrido</a:t>
+                      </a:r>
+                      <a:endParaRPr lang="es-MX" sz="700" b="0" i="0" u="none" strike="noStrike">
+                        <a:solidFill>
+                          <a:srgbClr val="000000"/>
+                        </a:solidFill>
+                        <a:effectLst/>
+                        <a:latin typeface="Calibri" panose="020F0502020204030204" pitchFamily="34" charset="0"/>
+                      </a:endParaRPr>
+                    </a:p>
+                  </a:txBody>
+                  <a:tcPr marL="0" marR="0" marT="0" marB="0" anchor="ctr"/>
+                </a:tc>
+              </a:tr>
+              <a:tr h="697773">
+                <a:tc>
+                  <a:txBody>
+                    <a:bodyPr/>
+                    <a:lstStyle/>
+                    <a:p>
+                      <a:pPr algn="ctr" fontAlgn="ctr"/>
+                      <a:r>
+                        <a:rPr lang="es-MX" sz="700" u="none" strike="noStrike">
+                          <a:effectLst/>
+                        </a:rPr>
+                        <a:t>5</a:t>
+                      </a:r>
+                      <a:endParaRPr lang="es-MX" sz="700" b="0" i="0" u="none" strike="noStrike">
+                        <a:solidFill>
+                          <a:srgbClr val="000000"/>
+                        </a:solidFill>
+                        <a:effectLst/>
+                        <a:latin typeface="Calibri" panose="020F0502020204030204" pitchFamily="34" charset="0"/>
+                      </a:endParaRPr>
+                    </a:p>
+                  </a:txBody>
+                  <a:tcPr marL="0" marR="0" marT="0" marB="0" anchor="ctr"/>
+                </a:tc>
+                <a:tc>
+                  <a:txBody>
+                    <a:bodyPr/>
+                    <a:lstStyle/>
+                    <a:p>
+                      <a:pPr algn="l" fontAlgn="t"/>
+                      <a:r>
+                        <a:rPr lang="es-ES" sz="700" u="none" strike="noStrike">
+                          <a:effectLst/>
+                        </a:rPr>
+                        <a:t>Debido a que el servicio web en ocasiones es inestable existe la probabilidad de que el sistema utilizado de tickets sea inaccesible por algunos momentos</a:t>
+                      </a:r>
+                      <a:endParaRPr lang="es-ES" sz="700" b="0" i="0" u="none" strike="noStrike">
+                        <a:solidFill>
+                          <a:srgbClr val="000000"/>
+                        </a:solidFill>
+                        <a:effectLst/>
+                        <a:latin typeface="Calibri" panose="020F0502020204030204" pitchFamily="34" charset="0"/>
+                      </a:endParaRPr>
+                    </a:p>
+                  </a:txBody>
+                  <a:tcPr marL="0" marR="0" marT="0" marB="0"/>
+                </a:tc>
+                <a:tc>
+                  <a:txBody>
+                    <a:bodyPr/>
+                    <a:lstStyle/>
+                    <a:p>
+                      <a:pPr algn="ctr" fontAlgn="ctr"/>
+                      <a:r>
+                        <a:rPr lang="es-MX" sz="700" u="none" strike="noStrike">
+                          <a:effectLst/>
+                        </a:rPr>
+                        <a:t>2</a:t>
+                      </a:r>
+                      <a:endParaRPr lang="es-MX" sz="700" b="0" i="0" u="none" strike="noStrike">
+                        <a:solidFill>
+                          <a:srgbClr val="000000"/>
+                        </a:solidFill>
+                        <a:effectLst/>
+                        <a:latin typeface="Calibri" panose="020F0502020204030204" pitchFamily="34" charset="0"/>
+                      </a:endParaRPr>
+                    </a:p>
+                  </a:txBody>
+                  <a:tcPr marL="0" marR="0" marT="0" marB="0" anchor="ctr"/>
+                </a:tc>
+                <a:tc>
+                  <a:txBody>
+                    <a:bodyPr/>
+                    <a:lstStyle/>
+                    <a:p>
+                      <a:pPr algn="ctr" fontAlgn="ctr"/>
+                      <a:r>
+                        <a:rPr lang="es-MX" sz="700" u="none" strike="noStrike">
+                          <a:effectLst/>
+                        </a:rPr>
+                        <a:t>45%</a:t>
+                      </a:r>
+                      <a:endParaRPr lang="es-MX" sz="700" b="0" i="0" u="none" strike="noStrike">
+                        <a:solidFill>
+                          <a:srgbClr val="000000"/>
+                        </a:solidFill>
+                        <a:effectLst/>
+                        <a:latin typeface="Calibri" panose="020F0502020204030204" pitchFamily="34" charset="0"/>
+                      </a:endParaRPr>
+                    </a:p>
+                  </a:txBody>
+                  <a:tcPr marL="0" marR="0" marT="0" marB="0" anchor="ctr"/>
+                </a:tc>
+                <a:tc>
+                  <a:txBody>
+                    <a:bodyPr/>
+                    <a:lstStyle/>
+                    <a:p>
+                      <a:pPr algn="ctr" fontAlgn="ctr"/>
+                      <a:r>
+                        <a:rPr lang="es-MX" sz="700" u="none" strike="noStrike">
+                          <a:effectLst/>
+                        </a:rPr>
+                        <a:t>0,9</a:t>
+                      </a:r>
+                      <a:endParaRPr lang="es-MX" sz="700" b="0" i="0" u="none" strike="noStrike">
+                        <a:solidFill>
+                          <a:srgbClr val="000000"/>
+                        </a:solidFill>
+                        <a:effectLst/>
+                        <a:latin typeface="Calibri" panose="020F0502020204030204" pitchFamily="34" charset="0"/>
+                      </a:endParaRPr>
+                    </a:p>
+                  </a:txBody>
+                  <a:tcPr marL="0" marR="0" marT="0" marB="0" anchor="ctr"/>
+                </a:tc>
+                <a:tc>
+                  <a:txBody>
+                    <a:bodyPr/>
+                    <a:lstStyle/>
+                    <a:p>
+                      <a:pPr algn="ctr" fontAlgn="ctr"/>
+                      <a:r>
+                        <a:rPr lang="es-MX" sz="700" u="none" strike="noStrike">
+                          <a:effectLst/>
+                        </a:rPr>
+                        <a:t>2</a:t>
+                      </a:r>
+                      <a:endParaRPr lang="es-MX" sz="700" b="0" i="0" u="none" strike="noStrike">
+                        <a:solidFill>
+                          <a:srgbClr val="000000"/>
+                        </a:solidFill>
+                        <a:effectLst/>
+                        <a:latin typeface="Calibri" panose="020F0502020204030204" pitchFamily="34" charset="0"/>
+                      </a:endParaRPr>
+                    </a:p>
+                  </a:txBody>
+                  <a:tcPr marL="0" marR="0" marT="0" marB="0" anchor="ctr"/>
+                </a:tc>
+                <a:tc>
+                  <a:txBody>
+                    <a:bodyPr/>
+                    <a:lstStyle/>
+                    <a:p>
+                      <a:pPr algn="l" fontAlgn="t"/>
+                      <a:r>
+                        <a:rPr lang="es-ES" sz="700" u="none" strike="noStrike">
+                          <a:effectLst/>
+                        </a:rPr>
+                        <a:t>Generar limpiezas y mantenimintos adecuados al servicio HTTP del servidor para evitar fallas</a:t>
+                      </a:r>
+                      <a:endParaRPr lang="es-ES" sz="700" b="0" i="0" u="none" strike="noStrike">
+                        <a:solidFill>
+                          <a:srgbClr val="000000"/>
+                        </a:solidFill>
+                        <a:effectLst/>
+                        <a:latin typeface="Calibri" panose="020F0502020204030204" pitchFamily="34" charset="0"/>
+                      </a:endParaRPr>
+                    </a:p>
+                  </a:txBody>
+                  <a:tcPr marL="0" marR="0" marT="0" marB="0"/>
+                </a:tc>
+                <a:tc>
+                  <a:txBody>
+                    <a:bodyPr/>
+                    <a:lstStyle/>
+                    <a:p>
+                      <a:pPr algn="l" fontAlgn="t"/>
+                      <a:r>
+                        <a:rPr lang="es-ES" sz="700" u="none" strike="noStrike">
+                          <a:effectLst/>
+                        </a:rPr>
+                        <a:t>Generar registro temporal en herramientas secundarias y en caso de falla total migrar la informacion a la herramienta vtigger</a:t>
+                      </a:r>
+                      <a:endParaRPr lang="es-ES" sz="700" b="0" i="0" u="none" strike="noStrike">
+                        <a:solidFill>
+                          <a:srgbClr val="000000"/>
+                        </a:solidFill>
+                        <a:effectLst/>
+                        <a:latin typeface="Calibri" panose="020F0502020204030204" pitchFamily="34" charset="0"/>
+                      </a:endParaRPr>
+                    </a:p>
+                  </a:txBody>
+                  <a:tcPr marL="0" marR="0" marT="0" marB="0"/>
+                </a:tc>
+                <a:tc>
+                  <a:txBody>
+                    <a:bodyPr/>
+                    <a:lstStyle/>
+                    <a:p>
+                      <a:pPr algn="ctr" fontAlgn="ctr"/>
+                      <a:r>
+                        <a:rPr lang="es-MX" sz="700" u="none" strike="noStrike">
+                          <a:effectLst/>
+                        </a:rPr>
+                        <a:t>Jovanny Zepeda</a:t>
+                      </a:r>
+                      <a:endParaRPr lang="es-MX" sz="700" b="0" i="0" u="none" strike="noStrike">
+                        <a:solidFill>
+                          <a:srgbClr val="000000"/>
+                        </a:solidFill>
+                        <a:effectLst/>
+                        <a:latin typeface="Calibri" panose="020F0502020204030204" pitchFamily="34" charset="0"/>
+                      </a:endParaRPr>
+                    </a:p>
+                  </a:txBody>
+                  <a:tcPr marL="0" marR="0" marT="0" marB="0" anchor="ctr"/>
+                </a:tc>
+                <a:tc>
+                  <a:txBody>
+                    <a:bodyPr/>
+                    <a:lstStyle/>
+                    <a:p>
+                      <a:pPr algn="ctr" fontAlgn="ctr"/>
+                      <a:r>
+                        <a:rPr lang="es-MX" sz="700" u="none" strike="noStrike">
+                          <a:effectLst/>
+                        </a:rPr>
+                        <a:t>Mitigado</a:t>
+                      </a:r>
+                      <a:endParaRPr lang="es-MX" sz="700" b="0" i="0" u="none" strike="noStrike">
+                        <a:solidFill>
+                          <a:srgbClr val="000000"/>
+                        </a:solidFill>
+                        <a:effectLst/>
+                        <a:latin typeface="Calibri" panose="020F0502020204030204" pitchFamily="34" charset="0"/>
+                      </a:endParaRPr>
+                    </a:p>
+                  </a:txBody>
+                  <a:tcPr marL="0" marR="0" marT="0" marB="0" anchor="ctr"/>
+                </a:tc>
+              </a:tr>
+              <a:tr h="558219">
+                <a:tc>
+                  <a:txBody>
+                    <a:bodyPr/>
+                    <a:lstStyle/>
+                    <a:p>
+                      <a:pPr algn="ctr" fontAlgn="ctr"/>
+                      <a:r>
+                        <a:rPr lang="es-MX" sz="700" u="none" strike="noStrike">
+                          <a:effectLst/>
+                        </a:rPr>
+                        <a:t>6</a:t>
+                      </a:r>
+                      <a:endParaRPr lang="es-MX" sz="700" b="0" i="0" u="none" strike="noStrike">
+                        <a:solidFill>
+                          <a:srgbClr val="000000"/>
+                        </a:solidFill>
+                        <a:effectLst/>
+                        <a:latin typeface="Calibri" panose="020F0502020204030204" pitchFamily="34" charset="0"/>
+                      </a:endParaRPr>
+                    </a:p>
+                  </a:txBody>
+                  <a:tcPr marL="0" marR="0" marT="0" marB="0" anchor="ctr"/>
+                </a:tc>
+                <a:tc>
+                  <a:txBody>
+                    <a:bodyPr/>
+                    <a:lstStyle/>
+                    <a:p>
+                      <a:pPr algn="l" fontAlgn="t"/>
+                      <a:r>
+                        <a:rPr lang="es-MX" sz="700" u="none" strike="noStrike">
+                          <a:effectLst/>
+                        </a:rPr>
+                        <a:t>Perdida o falta de integrantes del equipo basico de trabajo</a:t>
+                      </a:r>
+                      <a:endParaRPr lang="es-MX" sz="700" b="0" i="0" u="none" strike="noStrike">
+                        <a:solidFill>
+                          <a:srgbClr val="000000"/>
+                        </a:solidFill>
+                        <a:effectLst/>
+                        <a:latin typeface="Calibri" panose="020F0502020204030204" pitchFamily="34" charset="0"/>
+                      </a:endParaRPr>
+                    </a:p>
+                  </a:txBody>
+                  <a:tcPr marL="0" marR="0" marT="0" marB="0"/>
+                </a:tc>
+                <a:tc>
+                  <a:txBody>
+                    <a:bodyPr/>
+                    <a:lstStyle/>
+                    <a:p>
+                      <a:pPr algn="ctr" fontAlgn="ctr"/>
+                      <a:r>
+                        <a:rPr lang="es-MX" sz="700" u="none" strike="noStrike">
+                          <a:effectLst/>
+                        </a:rPr>
+                        <a:t>4</a:t>
+                      </a:r>
+                      <a:endParaRPr lang="es-MX" sz="700" b="0" i="0" u="none" strike="noStrike">
+                        <a:solidFill>
+                          <a:srgbClr val="000000"/>
+                        </a:solidFill>
+                        <a:effectLst/>
+                        <a:latin typeface="Calibri" panose="020F0502020204030204" pitchFamily="34" charset="0"/>
+                      </a:endParaRPr>
+                    </a:p>
+                  </a:txBody>
+                  <a:tcPr marL="0" marR="0" marT="0" marB="0" anchor="ctr"/>
+                </a:tc>
+                <a:tc>
+                  <a:txBody>
+                    <a:bodyPr/>
+                    <a:lstStyle/>
+                    <a:p>
+                      <a:pPr algn="ctr" fontAlgn="ctr"/>
+                      <a:r>
+                        <a:rPr lang="es-MX" sz="700" u="none" strike="noStrike">
+                          <a:effectLst/>
+                        </a:rPr>
+                        <a:t>55%</a:t>
+                      </a:r>
+                      <a:endParaRPr lang="es-MX" sz="700" b="0" i="0" u="none" strike="noStrike">
+                        <a:solidFill>
+                          <a:srgbClr val="000000"/>
+                        </a:solidFill>
+                        <a:effectLst/>
+                        <a:latin typeface="Calibri" panose="020F0502020204030204" pitchFamily="34" charset="0"/>
+                      </a:endParaRPr>
+                    </a:p>
+                  </a:txBody>
+                  <a:tcPr marL="0" marR="0" marT="0" marB="0" anchor="ctr"/>
+                </a:tc>
+                <a:tc>
+                  <a:txBody>
+                    <a:bodyPr/>
+                    <a:lstStyle/>
+                    <a:p>
+                      <a:pPr algn="ctr" fontAlgn="ctr"/>
+                      <a:r>
+                        <a:rPr lang="es-MX" sz="700" u="none" strike="noStrike">
+                          <a:effectLst/>
+                        </a:rPr>
+                        <a:t>2,2</a:t>
+                      </a:r>
+                      <a:endParaRPr lang="es-MX" sz="700" b="0" i="0" u="none" strike="noStrike">
+                        <a:solidFill>
+                          <a:srgbClr val="000000"/>
+                        </a:solidFill>
+                        <a:effectLst/>
+                        <a:latin typeface="Calibri" panose="020F0502020204030204" pitchFamily="34" charset="0"/>
+                      </a:endParaRPr>
+                    </a:p>
+                  </a:txBody>
+                  <a:tcPr marL="0" marR="0" marT="0" marB="0" anchor="ctr"/>
+                </a:tc>
+                <a:tc>
+                  <a:txBody>
+                    <a:bodyPr/>
+                    <a:lstStyle/>
+                    <a:p>
+                      <a:pPr algn="ctr" fontAlgn="ctr"/>
+                      <a:r>
+                        <a:rPr lang="es-MX" sz="700" u="none" strike="noStrike">
+                          <a:effectLst/>
+                        </a:rPr>
+                        <a:t>4</a:t>
+                      </a:r>
+                      <a:endParaRPr lang="es-MX" sz="700" b="0" i="0" u="none" strike="noStrike">
+                        <a:solidFill>
+                          <a:srgbClr val="000000"/>
+                        </a:solidFill>
+                        <a:effectLst/>
+                        <a:latin typeface="Calibri" panose="020F0502020204030204" pitchFamily="34" charset="0"/>
+                      </a:endParaRPr>
+                    </a:p>
+                  </a:txBody>
+                  <a:tcPr marL="0" marR="0" marT="0" marB="0" anchor="ctr"/>
+                </a:tc>
+                <a:tc>
+                  <a:txBody>
+                    <a:bodyPr/>
+                    <a:lstStyle/>
+                    <a:p>
+                      <a:pPr algn="l" fontAlgn="t"/>
+                      <a:r>
+                        <a:rPr lang="es-ES" sz="700" u="none" strike="noStrike">
+                          <a:effectLst/>
+                        </a:rPr>
+                        <a:t>Capacitar a todo el personal en diversas secciones</a:t>
+                      </a:r>
+                      <a:endParaRPr lang="es-ES" sz="700" b="0" i="0" u="none" strike="noStrike">
+                        <a:solidFill>
+                          <a:srgbClr val="000000"/>
+                        </a:solidFill>
+                        <a:effectLst/>
+                        <a:latin typeface="Calibri" panose="020F0502020204030204" pitchFamily="34" charset="0"/>
+                      </a:endParaRPr>
+                    </a:p>
+                  </a:txBody>
+                  <a:tcPr marL="0" marR="0" marT="0" marB="0"/>
+                </a:tc>
+                <a:tc>
+                  <a:txBody>
+                    <a:bodyPr/>
+                    <a:lstStyle/>
+                    <a:p>
+                      <a:pPr algn="l" fontAlgn="t"/>
+                      <a:r>
+                        <a:rPr lang="es-ES" sz="700" u="none" strike="noStrike">
+                          <a:effectLst/>
+                        </a:rPr>
+                        <a:t>Dividir tareas del trabajo diario entre integrantes disponibles y en caso de ausencia definitiva contratacion de personale</a:t>
+                      </a:r>
+                      <a:endParaRPr lang="es-ES" sz="700" b="0" i="0" u="none" strike="noStrike">
+                        <a:solidFill>
+                          <a:srgbClr val="000000"/>
+                        </a:solidFill>
+                        <a:effectLst/>
+                        <a:latin typeface="Calibri" panose="020F0502020204030204" pitchFamily="34" charset="0"/>
+                      </a:endParaRPr>
+                    </a:p>
+                  </a:txBody>
+                  <a:tcPr marL="0" marR="0" marT="0" marB="0"/>
+                </a:tc>
+                <a:tc>
+                  <a:txBody>
+                    <a:bodyPr/>
+                    <a:lstStyle/>
+                    <a:p>
+                      <a:pPr algn="ctr" fontAlgn="ctr"/>
+                      <a:r>
+                        <a:rPr lang="es-MX" sz="700" u="none" strike="noStrike">
+                          <a:effectLst/>
+                        </a:rPr>
+                        <a:t>Fidel Reyna</a:t>
+                      </a:r>
+                      <a:endParaRPr lang="es-MX" sz="700" b="0" i="0" u="none" strike="noStrike">
+                        <a:solidFill>
+                          <a:srgbClr val="000000"/>
+                        </a:solidFill>
+                        <a:effectLst/>
+                        <a:latin typeface="Calibri" panose="020F0502020204030204" pitchFamily="34" charset="0"/>
+                      </a:endParaRPr>
+                    </a:p>
+                  </a:txBody>
+                  <a:tcPr marL="0" marR="0" marT="0" marB="0" anchor="ctr"/>
+                </a:tc>
+                <a:tc>
+                  <a:txBody>
+                    <a:bodyPr/>
+                    <a:lstStyle/>
+                    <a:p>
+                      <a:pPr algn="ctr" fontAlgn="ctr"/>
+                      <a:r>
+                        <a:rPr lang="es-MX" sz="700" u="none" strike="noStrike">
+                          <a:effectLst/>
+                        </a:rPr>
+                        <a:t>Mitigado</a:t>
+                      </a:r>
+                      <a:endParaRPr lang="es-MX" sz="700" b="0" i="0" u="none" strike="noStrike">
+                        <a:solidFill>
+                          <a:srgbClr val="000000"/>
+                        </a:solidFill>
+                        <a:effectLst/>
+                        <a:latin typeface="Calibri" panose="020F0502020204030204" pitchFamily="34" charset="0"/>
+                      </a:endParaRPr>
+                    </a:p>
+                  </a:txBody>
+                  <a:tcPr marL="0" marR="0" marT="0" marB="0" anchor="ctr"/>
+                </a:tc>
+              </a:tr>
+              <a:tr h="418664">
+                <a:tc>
+                  <a:txBody>
+                    <a:bodyPr/>
+                    <a:lstStyle/>
+                    <a:p>
+                      <a:pPr algn="ctr" fontAlgn="ctr"/>
+                      <a:r>
+                        <a:rPr lang="es-MX" sz="700" u="none" strike="noStrike">
+                          <a:effectLst/>
+                        </a:rPr>
+                        <a:t>7</a:t>
+                      </a:r>
+                      <a:endParaRPr lang="es-MX" sz="700" b="0" i="0" u="none" strike="noStrike">
+                        <a:solidFill>
+                          <a:srgbClr val="000000"/>
+                        </a:solidFill>
+                        <a:effectLst/>
+                        <a:latin typeface="Calibri" panose="020F0502020204030204" pitchFamily="34" charset="0"/>
+                      </a:endParaRPr>
+                    </a:p>
+                  </a:txBody>
+                  <a:tcPr marL="0" marR="0" marT="0" marB="0" anchor="ctr"/>
+                </a:tc>
+                <a:tc>
+                  <a:txBody>
+                    <a:bodyPr/>
+                    <a:lstStyle/>
+                    <a:p>
+                      <a:pPr algn="l" fontAlgn="t"/>
+                      <a:r>
+                        <a:rPr lang="es-ES" sz="700" u="none" strike="noStrike">
+                          <a:effectLst/>
+                        </a:rPr>
+                        <a:t>Desviaciones de costos y esfuerzo elevadas a causa de exceso de clientes</a:t>
+                      </a:r>
+                      <a:endParaRPr lang="es-ES" sz="700" b="0" i="0" u="none" strike="noStrike">
+                        <a:solidFill>
+                          <a:srgbClr val="000000"/>
+                        </a:solidFill>
+                        <a:effectLst/>
+                        <a:latin typeface="Calibri" panose="020F0502020204030204" pitchFamily="34" charset="0"/>
+                      </a:endParaRPr>
+                    </a:p>
+                  </a:txBody>
+                  <a:tcPr marL="0" marR="0" marT="0" marB="0"/>
+                </a:tc>
+                <a:tc>
+                  <a:txBody>
+                    <a:bodyPr/>
+                    <a:lstStyle/>
+                    <a:p>
+                      <a:pPr algn="ctr" fontAlgn="ctr"/>
+                      <a:r>
+                        <a:rPr lang="es-MX" sz="700" u="none" strike="noStrike">
+                          <a:effectLst/>
+                        </a:rPr>
+                        <a:t>3</a:t>
+                      </a:r>
+                      <a:endParaRPr lang="es-MX" sz="700" b="0" i="0" u="none" strike="noStrike">
+                        <a:solidFill>
+                          <a:srgbClr val="000000"/>
+                        </a:solidFill>
+                        <a:effectLst/>
+                        <a:latin typeface="Calibri" panose="020F0502020204030204" pitchFamily="34" charset="0"/>
+                      </a:endParaRPr>
+                    </a:p>
+                  </a:txBody>
+                  <a:tcPr marL="0" marR="0" marT="0" marB="0" anchor="ctr"/>
+                </a:tc>
+                <a:tc>
+                  <a:txBody>
+                    <a:bodyPr/>
+                    <a:lstStyle/>
+                    <a:p>
+                      <a:pPr algn="ctr" fontAlgn="ctr"/>
+                      <a:r>
+                        <a:rPr lang="es-MX" sz="700" u="none" strike="noStrike">
+                          <a:effectLst/>
+                        </a:rPr>
+                        <a:t>60%</a:t>
+                      </a:r>
+                      <a:endParaRPr lang="es-MX" sz="700" b="0" i="0" u="none" strike="noStrike">
+                        <a:solidFill>
+                          <a:srgbClr val="000000"/>
+                        </a:solidFill>
+                        <a:effectLst/>
+                        <a:latin typeface="Calibri" panose="020F0502020204030204" pitchFamily="34" charset="0"/>
+                      </a:endParaRPr>
+                    </a:p>
+                  </a:txBody>
+                  <a:tcPr marL="0" marR="0" marT="0" marB="0" anchor="ctr"/>
+                </a:tc>
+                <a:tc>
+                  <a:txBody>
+                    <a:bodyPr/>
+                    <a:lstStyle/>
+                    <a:p>
+                      <a:pPr algn="ctr" fontAlgn="ctr"/>
+                      <a:r>
+                        <a:rPr lang="es-MX" sz="700" u="none" strike="noStrike">
+                          <a:effectLst/>
+                        </a:rPr>
+                        <a:t>1,8</a:t>
+                      </a:r>
+                      <a:endParaRPr lang="es-MX" sz="700" b="0" i="0" u="none" strike="noStrike">
+                        <a:solidFill>
+                          <a:srgbClr val="000000"/>
+                        </a:solidFill>
+                        <a:effectLst/>
+                        <a:latin typeface="Calibri" panose="020F0502020204030204" pitchFamily="34" charset="0"/>
+                      </a:endParaRPr>
+                    </a:p>
+                  </a:txBody>
+                  <a:tcPr marL="0" marR="0" marT="0" marB="0" anchor="ctr"/>
+                </a:tc>
+                <a:tc>
+                  <a:txBody>
+                    <a:bodyPr/>
+                    <a:lstStyle/>
+                    <a:p>
+                      <a:pPr algn="ctr" fontAlgn="ctr"/>
+                      <a:r>
+                        <a:rPr lang="es-MX" sz="700" u="none" strike="noStrike">
+                          <a:effectLst/>
+                        </a:rPr>
+                        <a:t>4</a:t>
+                      </a:r>
+                      <a:endParaRPr lang="es-MX" sz="700" b="0" i="0" u="none" strike="noStrike">
+                        <a:solidFill>
+                          <a:srgbClr val="000000"/>
+                        </a:solidFill>
+                        <a:effectLst/>
+                        <a:latin typeface="Calibri" panose="020F0502020204030204" pitchFamily="34" charset="0"/>
+                      </a:endParaRPr>
+                    </a:p>
+                  </a:txBody>
+                  <a:tcPr marL="0" marR="0" marT="0" marB="0" anchor="ctr"/>
+                </a:tc>
+                <a:tc>
+                  <a:txBody>
+                    <a:bodyPr/>
+                    <a:lstStyle/>
+                    <a:p>
+                      <a:pPr algn="l" fontAlgn="t"/>
+                      <a:r>
+                        <a:rPr lang="es-ES" sz="700" u="none" strike="noStrike">
+                          <a:effectLst/>
+                        </a:rPr>
+                        <a:t>Distribucion de trabajo entre equipo de trabajo</a:t>
+                      </a:r>
+                      <a:endParaRPr lang="es-ES" sz="700" b="0" i="0" u="none" strike="noStrike">
+                        <a:solidFill>
+                          <a:srgbClr val="000000"/>
+                        </a:solidFill>
+                        <a:effectLst/>
+                        <a:latin typeface="Calibri" panose="020F0502020204030204" pitchFamily="34" charset="0"/>
+                      </a:endParaRPr>
+                    </a:p>
+                  </a:txBody>
+                  <a:tcPr marL="0" marR="0" marT="0" marB="0"/>
+                </a:tc>
+                <a:tc>
+                  <a:txBody>
+                    <a:bodyPr/>
+                    <a:lstStyle/>
+                    <a:p>
+                      <a:pPr algn="l" fontAlgn="t"/>
+                      <a:r>
+                        <a:rPr lang="es-ES" sz="700" u="none" strike="noStrike">
+                          <a:effectLst/>
+                        </a:rPr>
+                        <a:t>Contratacion y capacitacion de personal nuevo que pueda cubrir necesidades de clientes</a:t>
+                      </a:r>
+                      <a:endParaRPr lang="es-ES" sz="700" b="0" i="0" u="none" strike="noStrike">
+                        <a:solidFill>
+                          <a:srgbClr val="000000"/>
+                        </a:solidFill>
+                        <a:effectLst/>
+                        <a:latin typeface="Calibri" panose="020F0502020204030204" pitchFamily="34" charset="0"/>
+                      </a:endParaRPr>
+                    </a:p>
+                  </a:txBody>
+                  <a:tcPr marL="0" marR="0" marT="0" marB="0"/>
+                </a:tc>
+                <a:tc>
+                  <a:txBody>
+                    <a:bodyPr/>
+                    <a:lstStyle/>
+                    <a:p>
+                      <a:pPr algn="ctr" fontAlgn="ctr"/>
+                      <a:r>
+                        <a:rPr lang="es-MX" sz="700" u="none" strike="noStrike">
+                          <a:effectLst/>
+                        </a:rPr>
+                        <a:t>Fidel Reyna</a:t>
+                      </a:r>
+                      <a:endParaRPr lang="es-MX" sz="700" b="0" i="0" u="none" strike="noStrike">
+                        <a:solidFill>
+                          <a:srgbClr val="000000"/>
+                        </a:solidFill>
+                        <a:effectLst/>
+                        <a:latin typeface="Calibri" panose="020F0502020204030204" pitchFamily="34" charset="0"/>
+                      </a:endParaRPr>
+                    </a:p>
+                  </a:txBody>
+                  <a:tcPr marL="0" marR="0" marT="0" marB="0" anchor="ctr"/>
+                </a:tc>
+                <a:tc>
+                  <a:txBody>
+                    <a:bodyPr/>
+                    <a:lstStyle/>
+                    <a:p>
+                      <a:pPr algn="ctr" fontAlgn="ctr"/>
+                      <a:r>
+                        <a:rPr lang="es-MX" sz="700" u="none" strike="noStrike">
+                          <a:effectLst/>
+                        </a:rPr>
                         <a:t>Abierto</a:t>
                       </a:r>
                       <a:endParaRPr lang="es-MX" sz="700" b="0" i="0" u="none" strike="noStrike">
@@ -5490,7 +6905,7 @@
                   <a:tcPr marL="0" marR="0" marT="0" marB="0" anchor="ctr"/>
                 </a:tc>
               </a:tr>
-              <a:tr h="780532">
+              <a:tr h="418664">
                 <a:tc>
                   <a:txBody>
                     <a:bodyPr/>
@@ -5501,7 +6916,7 @@
                         <a:rPr lang="es-MX" sz="700" u="none" strike="noStrike">
                           <a:effectLst/>
                         </a:rPr>
-                        <a:t>2</a:t>
+                        <a:t>8</a:t>
                       </a:r>
                       <a:endParaRPr lang="es-MX" sz="700" b="0" i="0" u="none" strike="noStrike">
                         <a:solidFill>
@@ -5521,10 +6936,125 @@
                     <a:p>
                       <a:pPr algn="l" fontAlgn="t"/>
                       <a:r>
+                        <a:rPr lang="es-MX" sz="700" u="none" strike="noStrike">
+                          <a:effectLst/>
+                        </a:rPr>
+                        <a:t>Perdida de repositorio de datos</a:t>
+                      </a:r>
+                      <a:endParaRPr lang="es-MX" sz="700" b="0" i="0" u="none" strike="noStrike">
+                        <a:solidFill>
+                          <a:srgbClr val="000000"/>
+                        </a:solidFill>
+                        <a:effectLst/>
+                        <a:latin typeface="Calibri" panose="020F0502020204030204" pitchFamily="34" charset="0"/>
+                      </a:endParaRPr>
+                    </a:p>
+                  </a:txBody>
+                  <a:tcPr marL="0" marR="0" marT="0" marB="0"/>
+                </a:tc>
+                <a:tc>
+                  <a:txBody>
+                    <a:bodyPr/>
+                    <a:lstStyle/>
+                    <a:p>
+                      <a:pPr algn="ctr" fontAlgn="ctr"/>
+                      <a:r>
+                        <a:rPr lang="es-MX" sz="700" u="none" strike="noStrike">
+                          <a:effectLst/>
+                        </a:rPr>
+                        <a:t>5</a:t>
+                      </a:r>
+                      <a:endParaRPr lang="es-MX" sz="700" b="0" i="0" u="none" strike="noStrike">
+                        <a:solidFill>
+                          <a:srgbClr val="000000"/>
+                        </a:solidFill>
+                        <a:effectLst/>
+                        <a:latin typeface="Calibri" panose="020F0502020204030204" pitchFamily="34" charset="0"/>
+                      </a:endParaRPr>
+                    </a:p>
+                  </a:txBody>
+                  <a:tcPr marL="0" marR="0" marT="0" marB="0" anchor="ctr"/>
+                </a:tc>
+                <a:tc>
+                  <a:txBody>
+                    <a:bodyPr/>
+                    <a:lstStyle/>
+                    <a:p>
+                      <a:pPr algn="ctr" fontAlgn="ctr"/>
+                      <a:r>
+                        <a:rPr lang="es-MX" sz="700" u="none" strike="noStrike">
+                          <a:effectLst/>
+                        </a:rPr>
+                        <a:t>15%</a:t>
+                      </a:r>
+                      <a:endParaRPr lang="es-MX" sz="700" b="0" i="0" u="none" strike="noStrike">
+                        <a:solidFill>
+                          <a:srgbClr val="000000"/>
+                        </a:solidFill>
+                        <a:effectLst/>
+                        <a:latin typeface="Calibri" panose="020F0502020204030204" pitchFamily="34" charset="0"/>
+                      </a:endParaRPr>
+                    </a:p>
+                  </a:txBody>
+                  <a:tcPr marL="0" marR="0" marT="0" marB="0" anchor="ctr"/>
+                </a:tc>
+                <a:tc>
+                  <a:txBody>
+                    <a:bodyPr/>
+                    <a:lstStyle/>
+                    <a:p>
+                      <a:pPr algn="ctr" fontAlgn="ctr"/>
+                      <a:r>
+                        <a:rPr lang="es-MX" sz="700" u="none" strike="noStrike">
+                          <a:effectLst/>
+                        </a:rPr>
+                        <a:t>0,75</a:t>
+                      </a:r>
+                      <a:endParaRPr lang="es-MX" sz="700" b="0" i="0" u="none" strike="noStrike">
+                        <a:solidFill>
+                          <a:srgbClr val="000000"/>
+                        </a:solidFill>
+                        <a:effectLst/>
+                        <a:latin typeface="Calibri" panose="020F0502020204030204" pitchFamily="34" charset="0"/>
+                      </a:endParaRPr>
+                    </a:p>
+                  </a:txBody>
+                  <a:tcPr marL="0" marR="0" marT="0" marB="0" anchor="ctr"/>
+                </a:tc>
+                <a:tc>
+                  <a:txBody>
+                    <a:bodyPr/>
+                    <a:lstStyle/>
+                    <a:p>
+                      <a:pPr algn="ctr" fontAlgn="ctr"/>
+                      <a:r>
+                        <a:rPr lang="es-MX" sz="700" u="none" strike="noStrike">
+                          <a:effectLst/>
+                        </a:rPr>
+                        <a:t>4</a:t>
+                      </a:r>
+                      <a:endParaRPr lang="es-MX" sz="700" b="0" i="0" u="none" strike="noStrike">
+                        <a:solidFill>
+                          <a:srgbClr val="000000"/>
+                        </a:solidFill>
+                        <a:effectLst/>
+                        <a:latin typeface="Calibri" panose="020F0502020204030204" pitchFamily="34" charset="0"/>
+                      </a:endParaRPr>
+                    </a:p>
+                  </a:txBody>
+                  <a:tcPr marL="0" marR="0" marT="0" marB="0" anchor="ctr"/>
+                </a:tc>
+                <a:tc>
+                  <a:txBody>
+                    <a:bodyPr/>
+                    <a:lstStyle/>
+                    <a:p>
+                      <a:pPr algn="l" fontAlgn="t"/>
+                      <a:r>
                         <a:rPr lang="es-ES" sz="700" u="none" strike="noStrike">
                           <a:effectLst/>
                         </a:rPr>
-                        <a:t>Si no se tiene el personal para la entrega del servicio calificado, la entrega del  podrían ser deficientes y no se lograría una entrega de calidad</a:t>
+                        <a:t>Generar espaldo secundario en maquinas ajenas al repositorio</a:t>
                       </a:r>
                       <a:endParaRPr lang="es-ES" sz="700" b="0" i="0" u="none" strike="noStrike">
                         <a:solidFill>
@@ -5542,12 +7072,35 @@
                     <a:bodyPr/>
                     <a:lstStyle/>
                     <a:p>
+                      <a:pPr algn="l" fontAlgn="t"/>
+                      <a:r>
+                        <a:rPr lang="es-ES" sz="700" u="none" strike="noStrike">
+                          <a:effectLst/>
+                        </a:rPr>
+                        <a:t>Generacion de un repositorio nuevo que contenga los datos del proyecto agregados</a:t>
+                      </a:r>
+                      <a:endParaRPr lang="es-ES" sz="700" b="0" i="0" u="none" strike="noStrike">
+                        <a:solidFill>
+                          <a:srgbClr val="000000"/>
+                        </a:solidFill>
+                        <a:effectLst/>
+                        <a:latin typeface="Calibri" panose="020F0502020204030204" pitchFamily="34" charset="0"/>
+                      </a:endParaRPr>
+                    </a:p>
+                  </a:txBody>
+                  <a:tcPr marL="0" marR="0" marT="0" marB="0"/>
+                </a:tc>
+                <a:tc>
+                  <a:txBody>
+                    <a:bodyPr/>
+                    <a:lstStyle/>
+                    <a:p>
                       <a:pPr algn="ctr" fontAlgn="ctr"/>
                       <a:r>
                         <a:rPr lang="es-MX" sz="700" u="none" strike="noStrike">
                           <a:effectLst/>
                         </a:rPr>
-                        <a:t>5</a:t>
+                        <a:t>Jovanny Zepeda</a:t>
                       </a:r>
                       <a:endParaRPr lang="es-MX" sz="700" b="0" i="0" u="none" strike="noStrike">
                         <a:solidFill>
@@ -5567,148 +7120,10 @@
                     <a:p>
                       <a:pPr algn="ctr" fontAlgn="ctr"/>
                       <a:r>
-                        <a:rPr lang="es-MX" sz="700" u="none" strike="noStrike">
-                          <a:effectLst/>
-                        </a:rPr>
-                        <a:t>30%</a:t>
-                      </a:r>
-                      <a:endParaRPr lang="es-MX" sz="700" b="0" i="0" u="none" strike="noStrike">
-                        <a:solidFill>
-                          <a:srgbClr val="000000"/>
-                        </a:solidFill>
-                        <a:effectLst/>
-                        <a:latin typeface="Calibri" panose="020F0502020204030204" pitchFamily="34" charset="0"/>
-                      </a:endParaRPr>
-                    </a:p>
-                  </a:txBody>
-                  <a:tcPr marL="0" marR="0" marT="0" marB="0" anchor="ctr"/>
-                </a:tc>
-                <a:tc>
-                  <a:txBody>
-                    <a:bodyPr/>
-                    <a:lstStyle/>
-                    <a:p>
-                      <a:pPr algn="ctr" fontAlgn="ctr"/>
-                      <a:r>
-                        <a:rPr lang="es-MX" sz="700" u="none" strike="noStrike">
-                          <a:effectLst/>
-                        </a:rPr>
-                        <a:t>1,5</a:t>
-                      </a:r>
-                      <a:endParaRPr lang="es-MX" sz="700" b="0" i="0" u="none" strike="noStrike">
-                        <a:solidFill>
-                          <a:srgbClr val="000000"/>
-                        </a:solidFill>
-                        <a:effectLst/>
-                        <a:latin typeface="Calibri" panose="020F0502020204030204" pitchFamily="34" charset="0"/>
-                      </a:endParaRPr>
-                    </a:p>
-                  </a:txBody>
-                  <a:tcPr marL="0" marR="0" marT="0" marB="0" anchor="ctr"/>
-                </a:tc>
-                <a:tc>
-                  <a:txBody>
-                    <a:bodyPr/>
-                    <a:lstStyle/>
-                    <a:p>
-                      <a:pPr algn="ctr" fontAlgn="ctr"/>
-                      <a:r>
-                        <a:rPr lang="es-MX" sz="700" u="none" strike="noStrike">
-                          <a:effectLst/>
-                        </a:rPr>
-                        <a:t>1</a:t>
-                      </a:r>
-                      <a:endParaRPr lang="es-MX" sz="700" b="0" i="0" u="none" strike="noStrike">
-                        <a:solidFill>
-                          <a:srgbClr val="000000"/>
-                        </a:solidFill>
-                        <a:effectLst/>
-                        <a:latin typeface="Calibri" panose="020F0502020204030204" pitchFamily="34" charset="0"/>
-                      </a:endParaRPr>
-                    </a:p>
-                  </a:txBody>
-                  <a:tcPr marL="0" marR="0" marT="0" marB="0" anchor="ctr"/>
-                </a:tc>
-                <a:tc>
-                  <a:txBody>
-                    <a:bodyPr/>
-                    <a:lstStyle/>
-                    <a:p>
-                      <a:pPr algn="l" fontAlgn="ctr"/>
-                      <a:r>
-                        <a:rPr lang="es-ES" sz="700" u="none" strike="noStrike">
-                          <a:effectLst/>
-                        </a:rPr>
-                        <a:t>Generar un plan de capacitación para incrementar las habilidades del personal</a:t>
-                      </a:r>
-                      <a:endParaRPr lang="es-ES" sz="700" b="0" i="0" u="none" strike="noStrike">
-                        <a:solidFill>
-                          <a:srgbClr val="000000"/>
-                        </a:solidFill>
-                        <a:effectLst/>
-                        <a:latin typeface="Calibri" panose="020F0502020204030204" pitchFamily="34" charset="0"/>
-                      </a:endParaRPr>
-                    </a:p>
-                  </a:txBody>
-                  <a:tcPr marL="0" marR="0" marT="0" marB="0" anchor="ctr"/>
-                </a:tc>
-                <a:tc>
-                  <a:txBody>
-                    <a:bodyPr/>
-                    <a:lstStyle/>
-                    <a:p>
-                      <a:pPr algn="l" fontAlgn="ctr"/>
-                      <a:r>
-                        <a:rPr lang="es-ES" sz="700" u="none" strike="noStrike">
-                          <a:effectLst/>
-                        </a:rPr>
-                        <a:t>Contratar personal experto en los servicios que ofrece la empresa</a:t>
-                      </a:r>
-                      <a:endParaRPr lang="es-ES" sz="700" b="0" i="0" u="none" strike="noStrike">
-                        <a:solidFill>
-                          <a:srgbClr val="000000"/>
-                        </a:solidFill>
-                        <a:effectLst/>
-                        <a:latin typeface="Calibri" panose="020F0502020204030204" pitchFamily="34" charset="0"/>
-                      </a:endParaRPr>
-                    </a:p>
-                  </a:txBody>
-                  <a:tcPr marL="0" marR="0" marT="0" marB="0" anchor="ctr"/>
-                </a:tc>
-                <a:tc>
-                  <a:txBody>
-                    <a:bodyPr/>
-                    <a:lstStyle/>
-                    <a:p>
-                      <a:pPr algn="ctr" fontAlgn="ctr"/>
-                      <a:r>
-                        <a:rPr lang="es-MX" sz="700" u="none" strike="noStrike">
-                          <a:effectLst/>
-                        </a:rPr>
-                        <a:t>Jovanny Zepeda</a:t>
-                      </a:r>
-                      <a:endParaRPr lang="es-MX" sz="700" b="0" i="0" u="none" strike="noStrike">
-                        <a:solidFill>
-                          <a:srgbClr val="000000"/>
-                        </a:solidFill>
-                        <a:effectLst/>
-                        <a:latin typeface="Calibri" panose="020F0502020204030204" pitchFamily="34" charset="0"/>
-                      </a:endParaRPr>
-                    </a:p>
-                  </a:txBody>
-                  <a:tcPr marL="0" marR="0" marT="0" marB="0" anchor="ctr"/>
-                </a:tc>
-                <a:tc>
-                  <a:txBody>
-                    <a:bodyPr/>
-                    <a:lstStyle/>
-                    <a:p>
-                      <a:pPr algn="ctr" fontAlgn="ctr"/>
-                      <a:r>
                         <a:rPr lang="es-MX" sz="700" u="none" strike="noStrike" dirty="0">
                           <a:effectLst/>
                         </a:rPr>
-                        <a:t>Abierto</a:t>
+                        <a:t>Mitigado</a:t>
                       </a:r>
                       <a:endParaRPr lang="es-MX" sz="700" b="0" i="0" u="none" strike="noStrike" dirty="0">
                         <a:solidFill>
@@ -5726,6 +7141,36 @@
           </a:graphicData>
         </a:graphic>
       </p:graphicFrame>
+      <p:sp>
+        <p:nvSpPr>
+          <p:cNvPr id="7" name="CuadroTexto 6"/>
+          <p:cNvSpPr txBox="1"/>
+          <p:nvPr/>
+        </p:nvSpPr>
+        <p:spPr>
+          <a:xfrm>
+            <a:off x="457200" y="6021288"/>
+            <a:ext cx="8686800" cy="646331"/>
+          </a:xfrm>
+          <a:prstGeom prst="rect">
+            <a:avLst/>
+          </a:prstGeom>
+          <a:noFill/>
+        </p:spPr>
+        <p:txBody>
+          <a:bodyPr wrap="square" rtlCol="0">
+            <a:spAutoFit/>
+          </a:bodyPr>
+          <a:lstStyle/>
+          <a:p>
+            <a:r>
+              <a:rPr lang="es-MX" dirty="0" smtClean="0"/>
+              <a:t>Se genera el plan de mitigación en caso de que el repositorio falle, por lo que se guarda la información en dos maquinas distintas.</a:t>
+            </a:r>
+            <a:endParaRPr lang="es-MX" dirty="0"/>
+          </a:p>
+        </p:txBody>
+      </p:sp>
     </p:spTree>
     <p:extLst>
       <p:ext uri="{BB962C8B-B14F-4D97-AF65-F5344CB8AC3E}">
@@ -6059,6 +7504,783 @@
 </p:sld>
 </file>
 
+<file path=ppt/slides/slide13.xml><?xml version="1.0" encoding="utf-8"?>
+<p:sld xmlns:a="http://schemas.openxmlformats.org/drawingml/2006/main" xmlns:r="http://schemas.openxmlformats.org/officeDocument/2006/relationships" xmlns:p="http://schemas.openxmlformats.org/presentationml/2006/main">
+  <p:cSld>
+    <p:spTree>
+      <p:nvGrpSpPr>
+        <p:cNvPr id="1" name=""/>
+        <p:cNvGrpSpPr/>
+        <p:nvPr/>
+      </p:nvGrpSpPr>
+      <p:grpSpPr>
+        <a:xfrm>
+          <a:off x="0" y="0"/>
+          <a:ext cx="0" cy="0"/>
+          <a:chOff x="0" y="0"/>
+          <a:chExt cx="0" cy="0"/>
+        </a:xfrm>
+      </p:grpSpPr>
+      <p:graphicFrame>
+        <p:nvGraphicFramePr>
+          <p:cNvPr id="5" name="Tabla 4"/>
+          <p:cNvGraphicFramePr>
+            <a:graphicFrameLocks noGrp="1"/>
+          </p:cNvGraphicFramePr>
+          <p:nvPr>
+            <p:extLst>
+              <p:ext uri="{D42A27DB-BD31-4B8C-83A1-F6EECF244321}">
+                <p14:modId xmlns:p14="http://schemas.microsoft.com/office/powerpoint/2010/main" val="3967955727"/>
+              </p:ext>
+            </p:extLst>
+          </p:nvPr>
+        </p:nvGraphicFramePr>
+        <p:xfrm>
+          <a:off x="1547664" y="2060847"/>
+          <a:ext cx="6912768" cy="2952331"/>
+        </p:xfrm>
+        <a:graphic>
+          <a:graphicData uri="http://schemas.openxmlformats.org/drawingml/2006/table">
+            <a:tbl>
+              <a:tblPr>
+                <a:tableStyleId>{5C22544A-7EE6-4342-B048-85BDC9FD1C3A}</a:tableStyleId>
+              </a:tblPr>
+              <a:tblGrid>
+                <a:gridCol w="1117214"/>
+                <a:gridCol w="2374082"/>
+                <a:gridCol w="2234430"/>
+                <a:gridCol w="1187042"/>
+              </a:tblGrid>
+              <a:tr h="346238">
+                <a:tc gridSpan="4">
+                  <a:txBody>
+                    <a:bodyPr/>
+                    <a:lstStyle/>
+                    <a:p>
+                      <a:pPr algn="ctr" fontAlgn="ctr"/>
+                      <a:r>
+                        <a:rPr lang="es-ES" sz="1100" u="none" strike="noStrike">
+                          <a:effectLst/>
+                        </a:rPr>
+                        <a:t>Bitacora de Respaldos semanales en el servicio de tickets</a:t>
+                      </a:r>
+                      <a:endParaRPr lang="es-ES" sz="1100" b="0" i="0" u="none" strike="noStrike">
+                        <a:solidFill>
+                          <a:srgbClr val="000000"/>
+                        </a:solidFill>
+                        <a:effectLst/>
+                        <a:latin typeface="Calibri" panose="020F0502020204030204" pitchFamily="34" charset="0"/>
+                      </a:endParaRPr>
+                    </a:p>
+                  </a:txBody>
+                  <a:tcPr marL="9525" marR="9525" marT="9525" marB="0" anchor="ctr"/>
+                </a:tc>
+                <a:tc hMerge="1">
+                  <a:txBody>
+                    <a:bodyPr/>
+                    <a:lstStyle/>
+                    <a:p>
+                      <a:endParaRPr lang="es-MX"/>
+                    </a:p>
+                  </a:txBody>
+                  <a:tcPr/>
+                </a:tc>
+                <a:tc hMerge="1">
+                  <a:txBody>
+                    <a:bodyPr/>
+                    <a:lstStyle/>
+                    <a:p>
+                      <a:endParaRPr lang="es-MX"/>
+                    </a:p>
+                  </a:txBody>
+                  <a:tcPr/>
+                </a:tc>
+                <a:tc hMerge="1">
+                  <a:txBody>
+                    <a:bodyPr/>
+                    <a:lstStyle/>
+                    <a:p>
+                      <a:endParaRPr lang="es-MX"/>
+                    </a:p>
+                  </a:txBody>
+                  <a:tcPr/>
+                </a:tc>
+              </a:tr>
+              <a:tr h="372299">
+                <a:tc>
+                  <a:txBody>
+                    <a:bodyPr/>
+                    <a:lstStyle/>
+                    <a:p>
+                      <a:pPr algn="ctr" fontAlgn="b"/>
+                      <a:r>
+                        <a:rPr lang="es-MX" sz="1100" u="none" strike="noStrike">
+                          <a:effectLst/>
+                        </a:rPr>
+                        <a:t>Fecha </a:t>
+                      </a:r>
+                      <a:endParaRPr lang="es-MX" sz="1100" b="0" i="0" u="none" strike="noStrike">
+                        <a:solidFill>
+                          <a:srgbClr val="000000"/>
+                        </a:solidFill>
+                        <a:effectLst/>
+                        <a:latin typeface="Calibri" panose="020F0502020204030204" pitchFamily="34" charset="0"/>
+                      </a:endParaRPr>
+                    </a:p>
+                  </a:txBody>
+                  <a:tcPr marL="9525" marR="9525" marT="9525" marB="0" anchor="b"/>
+                </a:tc>
+                <a:tc>
+                  <a:txBody>
+                    <a:bodyPr/>
+                    <a:lstStyle/>
+                    <a:p>
+                      <a:pPr algn="ctr" fontAlgn="b"/>
+                      <a:r>
+                        <a:rPr lang="es-MX" sz="1100" u="none" strike="noStrike">
+                          <a:effectLst/>
+                        </a:rPr>
+                        <a:t>Responsable </a:t>
+                      </a:r>
+                      <a:endParaRPr lang="es-MX" sz="1100" b="0" i="0" u="none" strike="noStrike">
+                        <a:solidFill>
+                          <a:srgbClr val="000000"/>
+                        </a:solidFill>
+                        <a:effectLst/>
+                        <a:latin typeface="Calibri" panose="020F0502020204030204" pitchFamily="34" charset="0"/>
+                      </a:endParaRPr>
+                    </a:p>
+                  </a:txBody>
+                  <a:tcPr marL="9525" marR="9525" marT="9525" marB="0" anchor="b"/>
+                </a:tc>
+                <a:tc>
+                  <a:txBody>
+                    <a:bodyPr/>
+                    <a:lstStyle/>
+                    <a:p>
+                      <a:pPr algn="ctr" fontAlgn="b"/>
+                      <a:r>
+                        <a:rPr lang="es-MX" sz="1100" u="none" strike="noStrike">
+                          <a:effectLst/>
+                        </a:rPr>
+                        <a:t>fecha en Repositorio</a:t>
+                      </a:r>
+                      <a:endParaRPr lang="es-MX" sz="1100" b="0" i="0" u="none" strike="noStrike">
+                        <a:solidFill>
+                          <a:srgbClr val="000000"/>
+                        </a:solidFill>
+                        <a:effectLst/>
+                        <a:latin typeface="Calibri" panose="020F0502020204030204" pitchFamily="34" charset="0"/>
+                      </a:endParaRPr>
+                    </a:p>
+                  </a:txBody>
+                  <a:tcPr marL="9525" marR="9525" marT="9525" marB="0" anchor="b"/>
+                </a:tc>
+                <a:tc>
+                  <a:txBody>
+                    <a:bodyPr/>
+                    <a:lstStyle/>
+                    <a:p>
+                      <a:pPr algn="ctr" fontAlgn="b"/>
+                      <a:r>
+                        <a:rPr lang="es-MX" sz="1100" u="none" strike="noStrike">
+                          <a:effectLst/>
+                        </a:rPr>
+                        <a:t>Estado</a:t>
+                      </a:r>
+                      <a:endParaRPr lang="es-MX" sz="1100" b="0" i="0" u="none" strike="noStrike">
+                        <a:solidFill>
+                          <a:srgbClr val="000000"/>
+                        </a:solidFill>
+                        <a:effectLst/>
+                        <a:latin typeface="Calibri" panose="020F0502020204030204" pitchFamily="34" charset="0"/>
+                      </a:endParaRPr>
+                    </a:p>
+                  </a:txBody>
+                  <a:tcPr marL="9525" marR="9525" marT="9525" marB="0" anchor="b"/>
+                </a:tc>
+              </a:tr>
+              <a:tr h="372299">
+                <a:tc>
+                  <a:txBody>
+                    <a:bodyPr/>
+                    <a:lstStyle/>
+                    <a:p>
+                      <a:pPr algn="r" fontAlgn="b"/>
+                      <a:r>
+                        <a:rPr lang="es-MX" sz="1100" u="none" strike="noStrike">
+                          <a:effectLst/>
+                        </a:rPr>
+                        <a:t>20/03/2015</a:t>
+                      </a:r>
+                      <a:endParaRPr lang="es-MX" sz="1100" b="0" i="0" u="none" strike="noStrike">
+                        <a:solidFill>
+                          <a:srgbClr val="000000"/>
+                        </a:solidFill>
+                        <a:effectLst/>
+                        <a:latin typeface="Calibri" panose="020F0502020204030204" pitchFamily="34" charset="0"/>
+                      </a:endParaRPr>
+                    </a:p>
+                  </a:txBody>
+                  <a:tcPr marL="9525" marR="9525" marT="9525" marB="0" anchor="b"/>
+                </a:tc>
+                <a:tc>
+                  <a:txBody>
+                    <a:bodyPr/>
+                    <a:lstStyle/>
+                    <a:p>
+                      <a:pPr algn="ctr" fontAlgn="b"/>
+                      <a:r>
+                        <a:rPr lang="es-MX" sz="1100" u="none" strike="noStrike">
+                          <a:effectLst/>
+                        </a:rPr>
+                        <a:t>Jovanny Zepeda</a:t>
+                      </a:r>
+                      <a:endParaRPr lang="es-MX" sz="1100" b="0" i="0" u="none" strike="noStrike">
+                        <a:solidFill>
+                          <a:srgbClr val="000000"/>
+                        </a:solidFill>
+                        <a:effectLst/>
+                        <a:latin typeface="Calibri" panose="020F0502020204030204" pitchFamily="34" charset="0"/>
+                      </a:endParaRPr>
+                    </a:p>
+                  </a:txBody>
+                  <a:tcPr marL="9525" marR="9525" marT="9525" marB="0" anchor="b"/>
+                </a:tc>
+                <a:tc>
+                  <a:txBody>
+                    <a:bodyPr/>
+                    <a:lstStyle/>
+                    <a:p>
+                      <a:pPr algn="ctr" fontAlgn="b"/>
+                      <a:r>
+                        <a:rPr lang="es-MX" sz="1100" u="none" strike="noStrike">
+                          <a:effectLst/>
+                        </a:rPr>
+                        <a:t>20/03/2015</a:t>
+                      </a:r>
+                      <a:endParaRPr lang="es-MX" sz="1100" b="0" i="0" u="none" strike="noStrike">
+                        <a:solidFill>
+                          <a:srgbClr val="000000"/>
+                        </a:solidFill>
+                        <a:effectLst/>
+                        <a:latin typeface="Calibri" panose="020F0502020204030204" pitchFamily="34" charset="0"/>
+                      </a:endParaRPr>
+                    </a:p>
+                  </a:txBody>
+                  <a:tcPr marL="9525" marR="9525" marT="9525" marB="0" anchor="b"/>
+                </a:tc>
+                <a:tc>
+                  <a:txBody>
+                    <a:bodyPr/>
+                    <a:lstStyle/>
+                    <a:p>
+                      <a:pPr algn="l" fontAlgn="b"/>
+                      <a:r>
+                        <a:rPr lang="es-MX" sz="1100" u="none" strike="noStrike">
+                          <a:effectLst/>
+                        </a:rPr>
+                        <a:t>Realizada</a:t>
+                      </a:r>
+                      <a:endParaRPr lang="es-MX" sz="1100" b="0" i="0" u="none" strike="noStrike">
+                        <a:solidFill>
+                          <a:srgbClr val="000000"/>
+                        </a:solidFill>
+                        <a:effectLst/>
+                        <a:latin typeface="Calibri" panose="020F0502020204030204" pitchFamily="34" charset="0"/>
+                      </a:endParaRPr>
+                    </a:p>
+                  </a:txBody>
+                  <a:tcPr marL="9525" marR="9525" marT="9525" marB="0" anchor="b"/>
+                </a:tc>
+              </a:tr>
+              <a:tr h="372299">
+                <a:tc>
+                  <a:txBody>
+                    <a:bodyPr/>
+                    <a:lstStyle/>
+                    <a:p>
+                      <a:pPr algn="r" fontAlgn="b"/>
+                      <a:r>
+                        <a:rPr lang="es-MX" sz="1100" u="none" strike="noStrike">
+                          <a:effectLst/>
+                        </a:rPr>
+                        <a:t>27/03/2015</a:t>
+                      </a:r>
+                      <a:endParaRPr lang="es-MX" sz="1100" b="0" i="0" u="none" strike="noStrike">
+                        <a:solidFill>
+                          <a:srgbClr val="000000"/>
+                        </a:solidFill>
+                        <a:effectLst/>
+                        <a:latin typeface="Calibri" panose="020F0502020204030204" pitchFamily="34" charset="0"/>
+                      </a:endParaRPr>
+                    </a:p>
+                  </a:txBody>
+                  <a:tcPr marL="9525" marR="9525" marT="9525" marB="0" anchor="b"/>
+                </a:tc>
+                <a:tc>
+                  <a:txBody>
+                    <a:bodyPr/>
+                    <a:lstStyle/>
+                    <a:p>
+                      <a:pPr algn="ctr" fontAlgn="b"/>
+                      <a:r>
+                        <a:rPr lang="es-MX" sz="1100" u="none" strike="noStrike">
+                          <a:effectLst/>
+                        </a:rPr>
+                        <a:t>Jovanny Zepeda</a:t>
+                      </a:r>
+                      <a:endParaRPr lang="es-MX" sz="1100" b="0" i="0" u="none" strike="noStrike">
+                        <a:solidFill>
+                          <a:srgbClr val="000000"/>
+                        </a:solidFill>
+                        <a:effectLst/>
+                        <a:latin typeface="Calibri" panose="020F0502020204030204" pitchFamily="34" charset="0"/>
+                      </a:endParaRPr>
+                    </a:p>
+                  </a:txBody>
+                  <a:tcPr marL="9525" marR="9525" marT="9525" marB="0" anchor="b"/>
+                </a:tc>
+                <a:tc>
+                  <a:txBody>
+                    <a:bodyPr/>
+                    <a:lstStyle/>
+                    <a:p>
+                      <a:pPr algn="ctr" fontAlgn="b"/>
+                      <a:r>
+                        <a:rPr lang="es-MX" sz="1100" u="none" strike="noStrike">
+                          <a:effectLst/>
+                        </a:rPr>
+                        <a:t>27/03/2015</a:t>
+                      </a:r>
+                      <a:endParaRPr lang="es-MX" sz="1100" b="0" i="0" u="none" strike="noStrike">
+                        <a:solidFill>
+                          <a:srgbClr val="000000"/>
+                        </a:solidFill>
+                        <a:effectLst/>
+                        <a:latin typeface="Calibri" panose="020F0502020204030204" pitchFamily="34" charset="0"/>
+                      </a:endParaRPr>
+                    </a:p>
+                  </a:txBody>
+                  <a:tcPr marL="9525" marR="9525" marT="9525" marB="0" anchor="b"/>
+                </a:tc>
+                <a:tc>
+                  <a:txBody>
+                    <a:bodyPr/>
+                    <a:lstStyle/>
+                    <a:p>
+                      <a:pPr algn="l" fontAlgn="b"/>
+                      <a:r>
+                        <a:rPr lang="es-MX" sz="1100" u="none" strike="noStrike">
+                          <a:effectLst/>
+                        </a:rPr>
+                        <a:t>Realizada</a:t>
+                      </a:r>
+                      <a:endParaRPr lang="es-MX" sz="1100" b="0" i="0" u="none" strike="noStrike">
+                        <a:solidFill>
+                          <a:srgbClr val="000000"/>
+                        </a:solidFill>
+                        <a:effectLst/>
+                        <a:latin typeface="Calibri" panose="020F0502020204030204" pitchFamily="34" charset="0"/>
+                      </a:endParaRPr>
+                    </a:p>
+                  </a:txBody>
+                  <a:tcPr marL="9525" marR="9525" marT="9525" marB="0" anchor="b"/>
+                </a:tc>
+              </a:tr>
+              <a:tr h="372299">
+                <a:tc>
+                  <a:txBody>
+                    <a:bodyPr/>
+                    <a:lstStyle/>
+                    <a:p>
+                      <a:pPr algn="r" fontAlgn="b"/>
+                      <a:r>
+                        <a:rPr lang="es-MX" sz="1100" u="none" strike="noStrike">
+                          <a:effectLst/>
+                        </a:rPr>
+                        <a:t>03/04/2015</a:t>
+                      </a:r>
+                      <a:endParaRPr lang="es-MX" sz="1100" b="0" i="0" u="none" strike="noStrike">
+                        <a:solidFill>
+                          <a:srgbClr val="000000"/>
+                        </a:solidFill>
+                        <a:effectLst/>
+                        <a:latin typeface="Calibri" panose="020F0502020204030204" pitchFamily="34" charset="0"/>
+                      </a:endParaRPr>
+                    </a:p>
+                  </a:txBody>
+                  <a:tcPr marL="9525" marR="9525" marT="9525" marB="0" anchor="b"/>
+                </a:tc>
+                <a:tc>
+                  <a:txBody>
+                    <a:bodyPr/>
+                    <a:lstStyle/>
+                    <a:p>
+                      <a:pPr algn="ctr" fontAlgn="b"/>
+                      <a:r>
+                        <a:rPr lang="es-MX" sz="1100" u="none" strike="noStrike">
+                          <a:effectLst/>
+                        </a:rPr>
+                        <a:t>Jovanny Zepeda</a:t>
+                      </a:r>
+                      <a:endParaRPr lang="es-MX" sz="1100" b="0" i="0" u="none" strike="noStrike">
+                        <a:solidFill>
+                          <a:srgbClr val="000000"/>
+                        </a:solidFill>
+                        <a:effectLst/>
+                        <a:latin typeface="Calibri" panose="020F0502020204030204" pitchFamily="34" charset="0"/>
+                      </a:endParaRPr>
+                    </a:p>
+                  </a:txBody>
+                  <a:tcPr marL="9525" marR="9525" marT="9525" marB="0" anchor="b"/>
+                </a:tc>
+                <a:tc>
+                  <a:txBody>
+                    <a:bodyPr/>
+                    <a:lstStyle/>
+                    <a:p>
+                      <a:pPr algn="ctr" fontAlgn="b"/>
+                      <a:r>
+                        <a:rPr lang="es-MX" sz="1100" u="none" strike="noStrike">
+                          <a:effectLst/>
+                        </a:rPr>
+                        <a:t>03/04/2015</a:t>
+                      </a:r>
+                      <a:endParaRPr lang="es-MX" sz="1100" b="0" i="0" u="none" strike="noStrike">
+                        <a:solidFill>
+                          <a:srgbClr val="000000"/>
+                        </a:solidFill>
+                        <a:effectLst/>
+                        <a:latin typeface="Calibri" panose="020F0502020204030204" pitchFamily="34" charset="0"/>
+                      </a:endParaRPr>
+                    </a:p>
+                  </a:txBody>
+                  <a:tcPr marL="9525" marR="9525" marT="9525" marB="0" anchor="b"/>
+                </a:tc>
+                <a:tc>
+                  <a:txBody>
+                    <a:bodyPr/>
+                    <a:lstStyle/>
+                    <a:p>
+                      <a:pPr algn="l" fontAlgn="b"/>
+                      <a:r>
+                        <a:rPr lang="es-MX" sz="1100" u="none" strike="noStrike">
+                          <a:effectLst/>
+                        </a:rPr>
+                        <a:t>Realizada</a:t>
+                      </a:r>
+                      <a:endParaRPr lang="es-MX" sz="1100" b="0" i="0" u="none" strike="noStrike">
+                        <a:solidFill>
+                          <a:srgbClr val="000000"/>
+                        </a:solidFill>
+                        <a:effectLst/>
+                        <a:latin typeface="Calibri" panose="020F0502020204030204" pitchFamily="34" charset="0"/>
+                      </a:endParaRPr>
+                    </a:p>
+                  </a:txBody>
+                  <a:tcPr marL="9525" marR="9525" marT="9525" marB="0" anchor="b"/>
+                </a:tc>
+              </a:tr>
+              <a:tr h="372299">
+                <a:tc>
+                  <a:txBody>
+                    <a:bodyPr/>
+                    <a:lstStyle/>
+                    <a:p>
+                      <a:pPr algn="r" fontAlgn="b"/>
+                      <a:r>
+                        <a:rPr lang="es-MX" sz="1100" u="none" strike="noStrike">
+                          <a:effectLst/>
+                        </a:rPr>
+                        <a:t>10/04/2015</a:t>
+                      </a:r>
+                      <a:endParaRPr lang="es-MX" sz="1100" b="0" i="0" u="none" strike="noStrike">
+                        <a:solidFill>
+                          <a:srgbClr val="000000"/>
+                        </a:solidFill>
+                        <a:effectLst/>
+                        <a:latin typeface="Calibri" panose="020F0502020204030204" pitchFamily="34" charset="0"/>
+                      </a:endParaRPr>
+                    </a:p>
+                  </a:txBody>
+                  <a:tcPr marL="9525" marR="9525" marT="9525" marB="0" anchor="b"/>
+                </a:tc>
+                <a:tc>
+                  <a:txBody>
+                    <a:bodyPr/>
+                    <a:lstStyle/>
+                    <a:p>
+                      <a:pPr algn="ctr" fontAlgn="b"/>
+                      <a:r>
+                        <a:rPr lang="es-MX" sz="1100" u="none" strike="noStrike">
+                          <a:effectLst/>
+                        </a:rPr>
+                        <a:t>Jovanny Zepeda</a:t>
+                      </a:r>
+                      <a:endParaRPr lang="es-MX" sz="1100" b="0" i="0" u="none" strike="noStrike">
+                        <a:solidFill>
+                          <a:srgbClr val="000000"/>
+                        </a:solidFill>
+                        <a:effectLst/>
+                        <a:latin typeface="Calibri" panose="020F0502020204030204" pitchFamily="34" charset="0"/>
+                      </a:endParaRPr>
+                    </a:p>
+                  </a:txBody>
+                  <a:tcPr marL="9525" marR="9525" marT="9525" marB="0" anchor="b"/>
+                </a:tc>
+                <a:tc>
+                  <a:txBody>
+                    <a:bodyPr/>
+                    <a:lstStyle/>
+                    <a:p>
+                      <a:pPr algn="ctr" fontAlgn="b"/>
+                      <a:r>
+                        <a:rPr lang="es-MX" sz="1100" u="none" strike="noStrike">
+                          <a:effectLst/>
+                        </a:rPr>
+                        <a:t>10/04/2015</a:t>
+                      </a:r>
+                      <a:endParaRPr lang="es-MX" sz="1100" b="0" i="0" u="none" strike="noStrike">
+                        <a:solidFill>
+                          <a:srgbClr val="000000"/>
+                        </a:solidFill>
+                        <a:effectLst/>
+                        <a:latin typeface="Calibri" panose="020F0502020204030204" pitchFamily="34" charset="0"/>
+                      </a:endParaRPr>
+                    </a:p>
+                  </a:txBody>
+                  <a:tcPr marL="9525" marR="9525" marT="9525" marB="0" anchor="b"/>
+                </a:tc>
+                <a:tc>
+                  <a:txBody>
+                    <a:bodyPr/>
+                    <a:lstStyle/>
+                    <a:p>
+                      <a:pPr algn="l" fontAlgn="b"/>
+                      <a:r>
+                        <a:rPr lang="es-MX" sz="1100" u="none" strike="noStrike">
+                          <a:effectLst/>
+                        </a:rPr>
+                        <a:t>Realizada</a:t>
+                      </a:r>
+                      <a:endParaRPr lang="es-MX" sz="1100" b="0" i="0" u="none" strike="noStrike">
+                        <a:solidFill>
+                          <a:srgbClr val="000000"/>
+                        </a:solidFill>
+                        <a:effectLst/>
+                        <a:latin typeface="Calibri" panose="020F0502020204030204" pitchFamily="34" charset="0"/>
+                      </a:endParaRPr>
+                    </a:p>
+                  </a:txBody>
+                  <a:tcPr marL="9525" marR="9525" marT="9525" marB="0" anchor="b"/>
+                </a:tc>
+              </a:tr>
+              <a:tr h="372299">
+                <a:tc>
+                  <a:txBody>
+                    <a:bodyPr/>
+                    <a:lstStyle/>
+                    <a:p>
+                      <a:pPr algn="r" fontAlgn="b"/>
+                      <a:r>
+                        <a:rPr lang="es-MX" sz="1100" u="none" strike="noStrike">
+                          <a:effectLst/>
+                        </a:rPr>
+                        <a:t>17/04/2015</a:t>
+                      </a:r>
+                      <a:endParaRPr lang="es-MX" sz="1100" b="0" i="0" u="none" strike="noStrike">
+                        <a:solidFill>
+                          <a:srgbClr val="000000"/>
+                        </a:solidFill>
+                        <a:effectLst/>
+                        <a:latin typeface="Calibri" panose="020F0502020204030204" pitchFamily="34" charset="0"/>
+                      </a:endParaRPr>
+                    </a:p>
+                  </a:txBody>
+                  <a:tcPr marL="9525" marR="9525" marT="9525" marB="0" anchor="b"/>
+                </a:tc>
+                <a:tc>
+                  <a:txBody>
+                    <a:bodyPr/>
+                    <a:lstStyle/>
+                    <a:p>
+                      <a:pPr algn="ctr" fontAlgn="b"/>
+                      <a:r>
+                        <a:rPr lang="es-MX" sz="1100" u="none" strike="noStrike">
+                          <a:effectLst/>
+                        </a:rPr>
+                        <a:t>Jovanny Zepeda</a:t>
+                      </a:r>
+                      <a:endParaRPr lang="es-MX" sz="1100" b="0" i="0" u="none" strike="noStrike">
+                        <a:solidFill>
+                          <a:srgbClr val="000000"/>
+                        </a:solidFill>
+                        <a:effectLst/>
+                        <a:latin typeface="Calibri" panose="020F0502020204030204" pitchFamily="34" charset="0"/>
+                      </a:endParaRPr>
+                    </a:p>
+                  </a:txBody>
+                  <a:tcPr marL="9525" marR="9525" marT="9525" marB="0" anchor="b"/>
+                </a:tc>
+                <a:tc>
+                  <a:txBody>
+                    <a:bodyPr/>
+                    <a:lstStyle/>
+                    <a:p>
+                      <a:pPr algn="ctr" fontAlgn="b"/>
+                      <a:r>
+                        <a:rPr lang="es-MX" sz="1100" u="none" strike="noStrike">
+                          <a:effectLst/>
+                        </a:rPr>
+                        <a:t>17/04/2015</a:t>
+                      </a:r>
+                      <a:endParaRPr lang="es-MX" sz="1100" b="0" i="0" u="none" strike="noStrike">
+                        <a:solidFill>
+                          <a:srgbClr val="000000"/>
+                        </a:solidFill>
+                        <a:effectLst/>
+                        <a:latin typeface="Calibri" panose="020F0502020204030204" pitchFamily="34" charset="0"/>
+                      </a:endParaRPr>
+                    </a:p>
+                  </a:txBody>
+                  <a:tcPr marL="9525" marR="9525" marT="9525" marB="0" anchor="b"/>
+                </a:tc>
+                <a:tc>
+                  <a:txBody>
+                    <a:bodyPr/>
+                    <a:lstStyle/>
+                    <a:p>
+                      <a:pPr algn="l" fontAlgn="b"/>
+                      <a:r>
+                        <a:rPr lang="es-MX" sz="1100" u="none" strike="noStrike">
+                          <a:effectLst/>
+                        </a:rPr>
+                        <a:t>Realizada</a:t>
+                      </a:r>
+                      <a:endParaRPr lang="es-MX" sz="1100" b="0" i="0" u="none" strike="noStrike">
+                        <a:solidFill>
+                          <a:srgbClr val="000000"/>
+                        </a:solidFill>
+                        <a:effectLst/>
+                        <a:latin typeface="Calibri" panose="020F0502020204030204" pitchFamily="34" charset="0"/>
+                      </a:endParaRPr>
+                    </a:p>
+                  </a:txBody>
+                  <a:tcPr marL="9525" marR="9525" marT="9525" marB="0" anchor="b"/>
+                </a:tc>
+              </a:tr>
+              <a:tr h="372299">
+                <a:tc>
+                  <a:txBody>
+                    <a:bodyPr/>
+                    <a:lstStyle/>
+                    <a:p>
+                      <a:pPr algn="r" fontAlgn="b"/>
+                      <a:r>
+                        <a:rPr lang="es-MX" sz="1100" u="none" strike="noStrike">
+                          <a:effectLst/>
+                        </a:rPr>
+                        <a:t>24/04/2015</a:t>
+                      </a:r>
+                      <a:endParaRPr lang="es-MX" sz="1100" b="0" i="0" u="none" strike="noStrike">
+                        <a:solidFill>
+                          <a:srgbClr val="000000"/>
+                        </a:solidFill>
+                        <a:effectLst/>
+                        <a:latin typeface="Calibri" panose="020F0502020204030204" pitchFamily="34" charset="0"/>
+                      </a:endParaRPr>
+                    </a:p>
+                  </a:txBody>
+                  <a:tcPr marL="9525" marR="9525" marT="9525" marB="0" anchor="b"/>
+                </a:tc>
+                <a:tc>
+                  <a:txBody>
+                    <a:bodyPr/>
+                    <a:lstStyle/>
+                    <a:p>
+                      <a:pPr algn="ctr" fontAlgn="b"/>
+                      <a:r>
+                        <a:rPr lang="es-MX" sz="1100" u="none" strike="noStrike">
+                          <a:effectLst/>
+                        </a:rPr>
+                        <a:t>Jovanny Zepeda</a:t>
+                      </a:r>
+                      <a:endParaRPr lang="es-MX" sz="1100" b="0" i="0" u="none" strike="noStrike">
+                        <a:solidFill>
+                          <a:srgbClr val="000000"/>
+                        </a:solidFill>
+                        <a:effectLst/>
+                        <a:latin typeface="Calibri" panose="020F0502020204030204" pitchFamily="34" charset="0"/>
+                      </a:endParaRPr>
+                    </a:p>
+                  </a:txBody>
+                  <a:tcPr marL="9525" marR="9525" marT="9525" marB="0" anchor="b"/>
+                </a:tc>
+                <a:tc>
+                  <a:txBody>
+                    <a:bodyPr/>
+                    <a:lstStyle/>
+                    <a:p>
+                      <a:pPr algn="ctr" fontAlgn="b"/>
+                      <a:r>
+                        <a:rPr lang="es-MX" sz="1100" u="none" strike="noStrike">
+                          <a:effectLst/>
+                        </a:rPr>
+                        <a:t> </a:t>
+                      </a:r>
+                      <a:endParaRPr lang="es-MX" sz="1100" b="0" i="0" u="none" strike="noStrike">
+                        <a:solidFill>
+                          <a:srgbClr val="000000"/>
+                        </a:solidFill>
+                        <a:effectLst/>
+                        <a:latin typeface="Calibri" panose="020F0502020204030204" pitchFamily="34" charset="0"/>
+                      </a:endParaRPr>
+                    </a:p>
+                  </a:txBody>
+                  <a:tcPr marL="9525" marR="9525" marT="9525" marB="0" anchor="b"/>
+                </a:tc>
+                <a:tc>
+                  <a:txBody>
+                    <a:bodyPr/>
+                    <a:lstStyle/>
+                    <a:p>
+                      <a:pPr algn="l" fontAlgn="b"/>
+                      <a:r>
+                        <a:rPr lang="es-MX" sz="1100" u="none" strike="noStrike" dirty="0">
+                          <a:effectLst/>
+                        </a:rPr>
+                        <a:t>No realizada</a:t>
+                      </a:r>
+                      <a:endParaRPr lang="es-MX" sz="1100" b="0" i="0" u="none" strike="noStrike" dirty="0">
+                        <a:solidFill>
+                          <a:srgbClr val="000000"/>
+                        </a:solidFill>
+                        <a:effectLst/>
+                        <a:latin typeface="Calibri" panose="020F0502020204030204" pitchFamily="34" charset="0"/>
+                      </a:endParaRPr>
+                    </a:p>
+                  </a:txBody>
+                  <a:tcPr marL="9525" marR="9525" marT="9525" marB="0" anchor="b"/>
+                </a:tc>
+              </a:tr>
+            </a:tbl>
+          </a:graphicData>
+        </a:graphic>
+      </p:graphicFrame>
+    </p:spTree>
+    <p:extLst>
+      <p:ext uri="{BB962C8B-B14F-4D97-AF65-F5344CB8AC3E}">
+        <p14:creationId xmlns:p14="http://schemas.microsoft.com/office/powerpoint/2010/main" val="2656159862"/>
+      </p:ext>
+    </p:extLst>
+  </p:cSld>
+  <p:clrMapOvr>
+    <a:masterClrMapping/>
+  </p:clrMapOvr>
+</p:sld>
+</file>
+
 <file path=ppt/slides/slide2.xml><?xml version="1.0" encoding="utf-8"?>
 <p:sld xmlns:a="http://schemas.openxmlformats.org/drawingml/2006/main" xmlns:r="http://schemas.openxmlformats.org/officeDocument/2006/relationships" xmlns:p="http://schemas.openxmlformats.org/presentationml/2006/main">
   <p:cSld>
@@ -6155,14 +8377,14 @@
           <p:nvPr>
             <p:extLst>
               <p:ext uri="{D42A27DB-BD31-4B8C-83A1-F6EECF244321}">
-                <p14:modId xmlns:p14="http://schemas.microsoft.com/office/powerpoint/2010/main" val="3921050492"/>
+                <p14:modId xmlns:p14="http://schemas.microsoft.com/office/powerpoint/2010/main" val="4046076438"/>
               </p:ext>
             </p:extLst>
           </p:nvPr>
         </p:nvGraphicFramePr>
         <p:xfrm>
           <a:off x="1524000" y="1397000"/>
-          <a:ext cx="6096000" cy="741680"/>
+          <a:ext cx="6096000" cy="1381760"/>
         </p:xfrm>
         <a:graphic>
           <a:graphicData uri="http://schemas.openxmlformats.org/drawingml/2006/table">
@@ -6262,6 +8484,53 @@
                       <a:r>
                         <a:rPr lang="es-MX" dirty="0" smtClean="0"/>
                         <a:t>09-02-15</a:t>
+                      </a:r>
+                      <a:endParaRPr lang="es-MX" dirty="0"/>
+                    </a:p>
+                  </a:txBody>
+                  <a:tcPr/>
+                </a:tc>
+              </a:tr>
+              <a:tr h="370840">
+                <a:tc>
+                  <a:txBody>
+                    <a:bodyPr/>
+                    <a:lstStyle/>
+                    <a:p>
+                      <a:pPr algn="ctr"/>
+                      <a:r>
+                        <a:rPr lang="es-MX" dirty="0" smtClean="0"/>
+                        <a:t>Contratos Clientes</a:t>
+                      </a:r>
+                      <a:endParaRPr lang="es-MX" dirty="0"/>
+                    </a:p>
+                  </a:txBody>
+                  <a:tcPr/>
+                </a:tc>
+                <a:tc>
+                  <a:txBody>
+                    <a:bodyPr/>
+                    <a:lstStyle/>
+                    <a:p>
+                      <a:pPr algn="ctr"/>
+                      <a:r>
+                        <a:rPr lang="es-MX" dirty="0" smtClean="0"/>
+                        <a:t>16-03-15</a:t>
+                      </a:r>
+                      <a:endParaRPr lang="es-MX" dirty="0"/>
+                    </a:p>
+                  </a:txBody>
+                  <a:tcPr/>
+                </a:tc>
+                <a:tc>
+                  <a:txBody>
+                    <a:bodyPr/>
+                    <a:lstStyle/>
+                    <a:p>
+                      <a:pPr algn="ctr"/>
+                      <a:r>
+                        <a:rPr lang="es-MX" dirty="0" smtClean="0"/>
+                        <a:t>01-04-15</a:t>
                       </a:r>
                       <a:endParaRPr lang="es-MX" dirty="0"/>
                     </a:p>
@@ -6466,7 +8735,6 @@
               <a:rPr lang="es-ES" dirty="0"/>
               <a:t> Capacitaciones: hasta la fecha no se han recibido capacitaciones, motive por el cual esta sección es anulada.</a:t>
             </a:r>
-            <a:endParaRPr lang="es-ES" dirty="0"/>
           </a:p>
         </p:txBody>
       </p:sp>
@@ -6607,7 +8875,7 @@
         <p:spPr>
           <a:xfrm>
             <a:off x="5220072" y="1416240"/>
-            <a:ext cx="3168352" cy="1477328"/>
+            <a:ext cx="3168352" cy="2308324"/>
           </a:xfrm>
           <a:prstGeom prst="rect">
             <a:avLst/>
@@ -6622,7 +8890,7 @@
           <a:p>
             <a:r>
               <a:rPr lang="es-MX" dirty="0" smtClean="0"/>
-              <a:t>Conforme el proyecto avanza los costos a planeación van reduciéndose debido a que deja de ser tan necesario como la de entrega</a:t>
+              <a:t>Por segunda vez consecutiva se muestra una desviación elevada en los costos dedicados al proyecto por lo que se sugiere evaluar la posibilidad de aplicar cambios en la estimación del proyecto.</a:t>
             </a:r>
             <a:endParaRPr lang="es-MX" dirty="0"/>
           </a:p>
@@ -6630,7 +8898,7 @@
       </p:sp>
       <p:graphicFrame>
         <p:nvGraphicFramePr>
-          <p:cNvPr id="6" name="1 Gráfico">
+          <p:cNvPr id="8" name="1 Gráfico">
             <a:extLst>
               <a:ext uri="{FF2B5EF4-FFF2-40B4-BE49-F238E27FC236}">
                 <a16:creationId xmlns:lc="http://schemas.openxmlformats.org/drawingml/2006/lockedCanvas" xmlns:a16="http://schemas.microsoft.com/office/drawing/2014/main" xmlns="" xmlns:xdr="http://schemas.openxmlformats.org/drawingml/2006/spreadsheetDrawing" id="{00000000-0008-0000-0200-000002000000}"/>
@@ -6643,13 +8911,13 @@
           <p:nvPr>
             <p:extLst>
               <p:ext uri="{D42A27DB-BD31-4B8C-83A1-F6EECF244321}">
-                <p14:modId xmlns:p14="http://schemas.microsoft.com/office/powerpoint/2010/main" val="732188097"/>
+                <p14:modId xmlns:p14="http://schemas.microsoft.com/office/powerpoint/2010/main" val="2976459620"/>
               </p:ext>
             </p:extLst>
           </p:nvPr>
         </p:nvGraphicFramePr>
         <p:xfrm>
-          <a:off x="482549" y="980728"/>
+          <a:off x="457200" y="908720"/>
           <a:ext cx="4667250" cy="2819400"/>
         </p:xfrm>
         <a:graphic>
@@ -6660,10 +8928,10 @@
       </p:graphicFrame>
       <p:graphicFrame>
         <p:nvGraphicFramePr>
-          <p:cNvPr id="7" name="2 Gráfico">
+          <p:cNvPr id="9" name="2 Gráfico">
             <a:extLst>
               <a:ext uri="{FF2B5EF4-FFF2-40B4-BE49-F238E27FC236}">
-                <a16:creationId xmlns:xdr="http://schemas.openxmlformats.org/drawingml/2006/spreadsheetDrawing" xmlns:a16="http://schemas.microsoft.com/office/drawing/2014/main" xmlns="" xmlns:lc="http://schemas.openxmlformats.org/drawingml/2006/lockedCanvas" id="{00000000-0008-0000-0200-000003000000}"/>
+                <a16:creationId xmlns:lc="http://schemas.openxmlformats.org/drawingml/2006/lockedCanvas" xmlns:a16="http://schemas.microsoft.com/office/drawing/2014/main" xmlns="" xmlns:xdr="http://schemas.openxmlformats.org/drawingml/2006/spreadsheetDrawing" id="{00000000-0008-0000-0200-000003000000}"/>
               </a:ext>
             </a:extLst>
           </p:cNvPr>
@@ -6673,13 +8941,13 @@
           <p:nvPr>
             <p:extLst>
               <p:ext uri="{D42A27DB-BD31-4B8C-83A1-F6EECF244321}">
-                <p14:modId xmlns:p14="http://schemas.microsoft.com/office/powerpoint/2010/main" val="1839323523"/>
+                <p14:modId xmlns:p14="http://schemas.microsoft.com/office/powerpoint/2010/main" val="2773342540"/>
               </p:ext>
             </p:extLst>
           </p:nvPr>
         </p:nvGraphicFramePr>
         <p:xfrm>
-          <a:off x="423277" y="3861048"/>
+          <a:off x="446804" y="3789040"/>
           <a:ext cx="4565650" cy="2800350"/>
         </p:xfrm>
         <a:graphic>
@@ -6813,10 +9081,10 @@
       </p:sp>
       <p:graphicFrame>
         <p:nvGraphicFramePr>
-          <p:cNvPr id="6" name="2 Gráfico">
+          <p:cNvPr id="8" name="2 Gráfico">
             <a:extLst>
               <a:ext uri="{FF2B5EF4-FFF2-40B4-BE49-F238E27FC236}">
-                <a16:creationId xmlns:xdr="http://schemas.openxmlformats.org/drawingml/2006/spreadsheetDrawing" xmlns:a16="http://schemas.microsoft.com/office/drawing/2014/main" xmlns="" xmlns:lc="http://schemas.openxmlformats.org/drawingml/2006/lockedCanvas" id="{00000000-0008-0000-0100-000003000000}"/>
+                <a16:creationId xmlns:lc="http://schemas.openxmlformats.org/drawingml/2006/lockedCanvas" xmlns:a16="http://schemas.microsoft.com/office/drawing/2014/main" xmlns="" xmlns:xdr="http://schemas.openxmlformats.org/drawingml/2006/spreadsheetDrawing" id="{00000000-0008-0000-0100-000003000000}"/>
               </a:ext>
             </a:extLst>
           </p:cNvPr>
@@ -6826,13 +9094,13 @@
           <p:nvPr>
             <p:extLst>
               <p:ext uri="{D42A27DB-BD31-4B8C-83A1-F6EECF244321}">
-                <p14:modId xmlns:p14="http://schemas.microsoft.com/office/powerpoint/2010/main" val="2368548433"/>
+                <p14:modId xmlns:p14="http://schemas.microsoft.com/office/powerpoint/2010/main" val="472414157"/>
               </p:ext>
             </p:extLst>
           </p:nvPr>
         </p:nvGraphicFramePr>
         <p:xfrm>
-          <a:off x="673776" y="1196752"/>
+          <a:off x="457200" y="980728"/>
           <a:ext cx="8011584" cy="2800350"/>
         </p:xfrm>
         <a:graphic>
@@ -6843,10 +9111,10 @@
       </p:graphicFrame>
       <p:graphicFrame>
         <p:nvGraphicFramePr>
-          <p:cNvPr id="7" name="4 Gráfico">
+          <p:cNvPr id="9" name="4 Gráfico">
             <a:extLst>
               <a:ext uri="{FF2B5EF4-FFF2-40B4-BE49-F238E27FC236}">
-                <a16:creationId xmlns:xdr="http://schemas.openxmlformats.org/drawingml/2006/spreadsheetDrawing" xmlns:a16="http://schemas.microsoft.com/office/drawing/2014/main" xmlns="" xmlns:lc="http://schemas.openxmlformats.org/drawingml/2006/lockedCanvas" id="{00000000-0008-0000-0100-000005000000}"/>
+                <a16:creationId xmlns:lc="http://schemas.openxmlformats.org/drawingml/2006/lockedCanvas" xmlns:a16="http://schemas.microsoft.com/office/drawing/2014/main" xmlns="" xmlns:xdr="http://schemas.openxmlformats.org/drawingml/2006/spreadsheetDrawing" id="{00000000-0008-0000-0100-000005000000}"/>
               </a:ext>
             </a:extLst>
           </p:cNvPr>
@@ -6856,13 +9124,13 @@
           <p:nvPr>
             <p:extLst>
               <p:ext uri="{D42A27DB-BD31-4B8C-83A1-F6EECF244321}">
-                <p14:modId xmlns:p14="http://schemas.microsoft.com/office/powerpoint/2010/main" val="2787132635"/>
+                <p14:modId xmlns:p14="http://schemas.microsoft.com/office/powerpoint/2010/main" val="3221678464"/>
               </p:ext>
             </p:extLst>
           </p:nvPr>
         </p:nvGraphicFramePr>
         <p:xfrm>
-          <a:off x="611560" y="3933056"/>
+          <a:off x="27689" y="3789040"/>
           <a:ext cx="7495117" cy="2800350"/>
         </p:xfrm>
         <a:graphic>
@@ -7201,31 +9469,7 @@
           <a:p>
             <a:r>
               <a:rPr lang="es-MX" dirty="0" smtClean="0"/>
-              <a:t>En la auditoria abril sale </a:t>
-            </a:r>
-            <a:r>
-              <a:rPr lang="es-MX" dirty="0" smtClean="0"/>
-              <a:t>correctamente </a:t>
-            </a:r>
-            <a:r>
-              <a:rPr lang="es-MX" dirty="0" smtClean="0"/>
-              <a:t>la </a:t>
-            </a:r>
-            <a:r>
-              <a:rPr lang="es-MX" dirty="0" smtClean="0"/>
-              <a:t>evaluación por </a:t>
-            </a:r>
-            <a:r>
-              <a:rPr lang="es-MX" dirty="0" smtClean="0"/>
-              <a:t>lo que aumenta la calificación en la </a:t>
-            </a:r>
-            <a:r>
-              <a:rPr lang="es-MX" dirty="0" smtClean="0"/>
-              <a:t>línea </a:t>
-            </a:r>
-            <a:r>
-              <a:rPr lang="es-MX" dirty="0" smtClean="0"/>
-              <a:t>base</a:t>
+              <a:t>En la auditoria abril sale correctamente la evaluación por lo que aumenta la calificación en la línea base</a:t>
             </a:r>
             <a:endParaRPr lang="es-MX" dirty="0"/>
           </a:p>

</xml_diff>

<commit_message>
Actualizacion de Hitos Abril
</commit_message>
<xml_diff>
--- a/qualtcom/Organizacional/Medicion y Monitoreo/Reporte Monitoreo-150430.pptx
+++ b/qualtcom/Organizacional/Medicion y Monitoreo/Reporte Monitoreo-150430.pptx
@@ -166,7 +166,6 @@
           </a:p>
         </c:rich>
       </c:tx>
-      <c:layout/>
       <c:overlay val="0"/>
     </c:title>
     <c:autoTitleDeleted val="0"/>
@@ -285,11 +284,11 @@
           <c:showBubbleSize val="0"/>
         </c:dLbls>
         <c:gapWidth val="150"/>
-        <c:axId val="59498576"/>
-        <c:axId val="59499136"/>
+        <c:axId val="100904336"/>
+        <c:axId val="100904896"/>
       </c:barChart>
       <c:catAx>
-        <c:axId val="59498576"/>
+        <c:axId val="100904336"/>
         <c:scaling>
           <c:orientation val="minMax"/>
         </c:scaling>
@@ -299,7 +298,7 @@
         <c:majorTickMark val="none"/>
         <c:minorTickMark val="none"/>
         <c:tickLblPos val="nextTo"/>
-        <c:crossAx val="59499136"/>
+        <c:crossAx val="100904896"/>
         <c:crosses val="autoZero"/>
         <c:auto val="1"/>
         <c:lblAlgn val="ctr"/>
@@ -307,7 +306,7 @@
         <c:noMultiLvlLbl val="0"/>
       </c:catAx>
       <c:valAx>
-        <c:axId val="59499136"/>
+        <c:axId val="100904896"/>
         <c:scaling>
           <c:orientation val="minMax"/>
         </c:scaling>
@@ -318,14 +317,13 @@
         <c:majorTickMark val="none"/>
         <c:minorTickMark val="none"/>
         <c:tickLblPos val="nextTo"/>
-        <c:crossAx val="59498576"/>
+        <c:crossAx val="100904336"/>
         <c:crosses val="autoZero"/>
         <c:crossBetween val="between"/>
       </c:valAx>
     </c:plotArea>
     <c:legend>
       <c:legendPos val="r"/>
-      <c:layout/>
       <c:overlay val="0"/>
     </c:legend>
     <c:plotVisOnly val="1"/>
@@ -368,7 +366,6 @@
           </a:p>
         </c:rich>
       </c:tx>
-      <c:layout/>
       <c:overlay val="0"/>
     </c:title>
     <c:autoTitleDeleted val="0"/>
@@ -437,11 +434,11 @@
           <c:showBubbleSize val="0"/>
         </c:dLbls>
         <c:gapWidth val="150"/>
-        <c:axId val="59501376"/>
-        <c:axId val="59501936"/>
+        <c:axId val="100907136"/>
+        <c:axId val="100907696"/>
       </c:barChart>
       <c:catAx>
-        <c:axId val="59501376"/>
+        <c:axId val="100907136"/>
         <c:scaling>
           <c:orientation val="minMax"/>
         </c:scaling>
@@ -451,7 +448,7 @@
         <c:majorTickMark val="out"/>
         <c:minorTickMark val="none"/>
         <c:tickLblPos val="nextTo"/>
-        <c:crossAx val="59501936"/>
+        <c:crossAx val="100907696"/>
         <c:crosses val="autoZero"/>
         <c:auto val="1"/>
         <c:lblAlgn val="ctr"/>
@@ -459,7 +456,7 @@
         <c:noMultiLvlLbl val="0"/>
       </c:catAx>
       <c:valAx>
-        <c:axId val="59501936"/>
+        <c:axId val="100907696"/>
         <c:scaling>
           <c:orientation val="minMax"/>
           <c:max val="1"/>
@@ -472,7 +469,7 @@
         <c:majorTickMark val="out"/>
         <c:minorTickMark val="none"/>
         <c:tickLblPos val="nextTo"/>
-        <c:crossAx val="59501376"/>
+        <c:crossAx val="100907136"/>
         <c:crosses val="autoZero"/>
         <c:crossBetween val="between"/>
       </c:valAx>
@@ -715,11 +712,11 @@
           <c:showBubbleSize val="0"/>
         </c:dLbls>
         <c:gapWidth val="150"/>
-        <c:axId val="101553296"/>
-        <c:axId val="101553856"/>
+        <c:axId val="100910496"/>
+        <c:axId val="100911056"/>
       </c:barChart>
       <c:catAx>
-        <c:axId val="101553296"/>
+        <c:axId val="100910496"/>
         <c:scaling>
           <c:orientation val="minMax"/>
         </c:scaling>
@@ -729,7 +726,7 @@
         <c:majorTickMark val="none"/>
         <c:minorTickMark val="none"/>
         <c:tickLblPos val="nextTo"/>
-        <c:crossAx val="101553856"/>
+        <c:crossAx val="100911056"/>
         <c:crosses val="autoZero"/>
         <c:auto val="1"/>
         <c:lblAlgn val="ctr"/>
@@ -737,7 +734,7 @@
         <c:noMultiLvlLbl val="0"/>
       </c:catAx>
       <c:valAx>
-        <c:axId val="101553856"/>
+        <c:axId val="100911056"/>
         <c:scaling>
           <c:orientation val="minMax"/>
         </c:scaling>
@@ -748,7 +745,7 @@
         <c:majorTickMark val="none"/>
         <c:minorTickMark val="none"/>
         <c:tickLblPos val="nextTo"/>
-        <c:crossAx val="101553296"/>
+        <c:crossAx val="100910496"/>
         <c:crosses val="autoZero"/>
         <c:crossBetween val="between"/>
       </c:valAx>
@@ -915,11 +912,11 @@
           <c:showBubbleSize val="0"/>
         </c:dLbls>
         <c:gapWidth val="150"/>
-        <c:axId val="101556096"/>
-        <c:axId val="101556656"/>
+        <c:axId val="101083936"/>
+        <c:axId val="101084496"/>
       </c:barChart>
       <c:catAx>
-        <c:axId val="101556096"/>
+        <c:axId val="101083936"/>
         <c:scaling>
           <c:orientation val="minMax"/>
         </c:scaling>
@@ -929,7 +926,7 @@
         <c:majorTickMark val="out"/>
         <c:minorTickMark val="none"/>
         <c:tickLblPos val="nextTo"/>
-        <c:crossAx val="101556656"/>
+        <c:crossAx val="101084496"/>
         <c:crosses val="autoZero"/>
         <c:auto val="1"/>
         <c:lblAlgn val="ctr"/>
@@ -937,7 +934,7 @@
         <c:noMultiLvlLbl val="0"/>
       </c:catAx>
       <c:valAx>
-        <c:axId val="101556656"/>
+        <c:axId val="101084496"/>
         <c:scaling>
           <c:orientation val="minMax"/>
           <c:max val="1"/>
@@ -950,7 +947,7 @@
         <c:majorTickMark val="out"/>
         <c:minorTickMark val="none"/>
         <c:tickLblPos val="nextTo"/>
-        <c:crossAx val="101556096"/>
+        <c:crossAx val="101083936"/>
         <c:crosses val="autoZero"/>
         <c:crossBetween val="between"/>
       </c:valAx>
@@ -1058,11 +1055,11 @@
           <c:showBubbleSize val="0"/>
         </c:dLbls>
         <c:gapWidth val="150"/>
-        <c:axId val="101990000"/>
-        <c:axId val="101990560"/>
+        <c:axId val="101086736"/>
+        <c:axId val="101087296"/>
       </c:barChart>
       <c:catAx>
-        <c:axId val="101990000"/>
+        <c:axId val="101086736"/>
         <c:scaling>
           <c:orientation val="minMax"/>
         </c:scaling>
@@ -1072,7 +1069,7 @@
         <c:majorTickMark val="none"/>
         <c:minorTickMark val="none"/>
         <c:tickLblPos val="nextTo"/>
-        <c:crossAx val="101990560"/>
+        <c:crossAx val="101087296"/>
         <c:crosses val="autoZero"/>
         <c:auto val="1"/>
         <c:lblAlgn val="ctr"/>
@@ -1080,7 +1077,7 @@
         <c:noMultiLvlLbl val="0"/>
       </c:catAx>
       <c:valAx>
-        <c:axId val="101990560"/>
+        <c:axId val="101087296"/>
         <c:scaling>
           <c:orientation val="minMax"/>
           <c:max val="1"/>
@@ -1092,7 +1089,7 @@
         <c:majorTickMark val="none"/>
         <c:minorTickMark val="none"/>
         <c:tickLblPos val="nextTo"/>
-        <c:crossAx val="101990000"/>
+        <c:crossAx val="101086736"/>
         <c:crosses val="autoZero"/>
         <c:crossBetween val="between"/>
       </c:valAx>
@@ -1206,11 +1203,11 @@
           <c:showBubbleSize val="0"/>
         </c:dLbls>
         <c:gapWidth val="150"/>
-        <c:axId val="101993360"/>
-        <c:axId val="101993920"/>
+        <c:axId val="101090096"/>
+        <c:axId val="100663808"/>
       </c:barChart>
       <c:catAx>
-        <c:axId val="101993360"/>
+        <c:axId val="101090096"/>
         <c:scaling>
           <c:orientation val="minMax"/>
         </c:scaling>
@@ -1220,7 +1217,7 @@
         <c:majorTickMark val="none"/>
         <c:minorTickMark val="none"/>
         <c:tickLblPos val="nextTo"/>
-        <c:crossAx val="101993920"/>
+        <c:crossAx val="100663808"/>
         <c:crosses val="autoZero"/>
         <c:auto val="1"/>
         <c:lblAlgn val="ctr"/>
@@ -1228,7 +1225,7 @@
         <c:noMultiLvlLbl val="0"/>
       </c:catAx>
       <c:valAx>
-        <c:axId val="101993920"/>
+        <c:axId val="100663808"/>
         <c:scaling>
           <c:orientation val="minMax"/>
           <c:max val="1"/>
@@ -1240,7 +1237,7 @@
         <c:majorTickMark val="none"/>
         <c:minorTickMark val="none"/>
         <c:tickLblPos val="nextTo"/>
-        <c:crossAx val="101993360"/>
+        <c:crossAx val="101090096"/>
         <c:crosses val="autoZero"/>
         <c:crossBetween val="between"/>
       </c:valAx>
@@ -1360,11 +1357,11 @@
           <c:showBubbleSize val="0"/>
         </c:dLbls>
         <c:gapWidth val="150"/>
-        <c:axId val="101996720"/>
-        <c:axId val="101997280"/>
+        <c:axId val="100666608"/>
+        <c:axId val="100667168"/>
       </c:barChart>
       <c:catAx>
-        <c:axId val="101996720"/>
+        <c:axId val="100666608"/>
         <c:scaling>
           <c:orientation val="minMax"/>
         </c:scaling>
@@ -1374,7 +1371,7 @@
         <c:majorTickMark val="none"/>
         <c:minorTickMark val="none"/>
         <c:tickLblPos val="nextTo"/>
-        <c:crossAx val="101997280"/>
+        <c:crossAx val="100667168"/>
         <c:crosses val="autoZero"/>
         <c:auto val="1"/>
         <c:lblAlgn val="ctr"/>
@@ -1382,7 +1379,7 @@
         <c:noMultiLvlLbl val="0"/>
       </c:catAx>
       <c:valAx>
-        <c:axId val="101997280"/>
+        <c:axId val="100667168"/>
         <c:scaling>
           <c:orientation val="minMax"/>
           <c:max val="1"/>
@@ -1394,7 +1391,7 @@
         <c:majorTickMark val="none"/>
         <c:minorTickMark val="none"/>
         <c:tickLblPos val="nextTo"/>
-        <c:crossAx val="101996720"/>
+        <c:crossAx val="100666608"/>
         <c:crosses val="autoZero"/>
         <c:crossBetween val="between"/>
       </c:valAx>
@@ -1508,11 +1505,11 @@
           <c:showBubbleSize val="0"/>
         </c:dLbls>
         <c:gapWidth val="150"/>
-        <c:axId val="101174944"/>
-        <c:axId val="101175504"/>
+        <c:axId val="100669968"/>
+        <c:axId val="100670528"/>
       </c:barChart>
       <c:catAx>
-        <c:axId val="101174944"/>
+        <c:axId val="100669968"/>
         <c:scaling>
           <c:orientation val="minMax"/>
         </c:scaling>
@@ -1522,7 +1519,7 @@
         <c:majorTickMark val="none"/>
         <c:minorTickMark val="none"/>
         <c:tickLblPos val="nextTo"/>
-        <c:crossAx val="101175504"/>
+        <c:crossAx val="100670528"/>
         <c:crosses val="autoZero"/>
         <c:auto val="1"/>
         <c:lblAlgn val="ctr"/>
@@ -1530,7 +1527,7 @@
         <c:noMultiLvlLbl val="0"/>
       </c:catAx>
       <c:valAx>
-        <c:axId val="101175504"/>
+        <c:axId val="100670528"/>
         <c:scaling>
           <c:orientation val="minMax"/>
         </c:scaling>
@@ -1541,7 +1538,7 @@
         <c:majorTickMark val="none"/>
         <c:minorTickMark val="none"/>
         <c:tickLblPos val="nextTo"/>
-        <c:crossAx val="101174944"/>
+        <c:crossAx val="100669968"/>
         <c:crosses val="autoZero"/>
         <c:crossBetween val="between"/>
       </c:valAx>
@@ -1762,11 +1759,11 @@
           <c:showBubbleSize val="0"/>
         </c:dLbls>
         <c:gapWidth val="150"/>
-        <c:axId val="101179424"/>
-        <c:axId val="101179984"/>
+        <c:axId val="101771056"/>
+        <c:axId val="101771616"/>
       </c:barChart>
       <c:catAx>
-        <c:axId val="101179424"/>
+        <c:axId val="101771056"/>
         <c:scaling>
           <c:orientation val="minMax"/>
         </c:scaling>
@@ -1776,7 +1773,7 @@
         <c:majorTickMark val="none"/>
         <c:minorTickMark val="none"/>
         <c:tickLblPos val="nextTo"/>
-        <c:crossAx val="101179984"/>
+        <c:crossAx val="101771616"/>
         <c:crosses val="autoZero"/>
         <c:auto val="1"/>
         <c:lblAlgn val="ctr"/>
@@ -1784,7 +1781,7 @@
         <c:noMultiLvlLbl val="0"/>
       </c:catAx>
       <c:valAx>
-        <c:axId val="101179984"/>
+        <c:axId val="101771616"/>
         <c:scaling>
           <c:orientation val="minMax"/>
           <c:max val="1"/>
@@ -1796,7 +1793,7 @@
         <c:majorTickMark val="none"/>
         <c:minorTickMark val="none"/>
         <c:tickLblPos val="nextTo"/>
-        <c:crossAx val="101179424"/>
+        <c:crossAx val="101771056"/>
         <c:crosses val="autoZero"/>
         <c:crossBetween val="between"/>
       </c:valAx>
@@ -8377,14 +8374,14 @@
           <p:nvPr>
             <p:extLst>
               <p:ext uri="{D42A27DB-BD31-4B8C-83A1-F6EECF244321}">
-                <p14:modId xmlns:p14="http://schemas.microsoft.com/office/powerpoint/2010/main" val="4046076438"/>
+                <p14:modId xmlns:p14="http://schemas.microsoft.com/office/powerpoint/2010/main" val="3933535689"/>
               </p:ext>
             </p:extLst>
           </p:nvPr>
         </p:nvGraphicFramePr>
         <p:xfrm>
           <a:off x="1524000" y="1397000"/>
-          <a:ext cx="6096000" cy="1381760"/>
+          <a:ext cx="6096000" cy="1909584"/>
         </p:xfrm>
         <a:graphic>
           <a:graphicData uri="http://schemas.openxmlformats.org/drawingml/2006/table">
@@ -8491,6 +8488,53 @@
                   <a:tcPr/>
                 </a:tc>
               </a:tr>
+              <a:tr h="426224">
+                <a:tc>
+                  <a:txBody>
+                    <a:bodyPr/>
+                    <a:lstStyle/>
+                    <a:p>
+                      <a:pPr algn="ctr"/>
+                      <a:r>
+                        <a:rPr lang="es-MX" dirty="0" smtClean="0"/>
+                        <a:t>Febrero</a:t>
+                      </a:r>
+                      <a:endParaRPr lang="es-MX" dirty="0"/>
+                    </a:p>
+                  </a:txBody>
+                  <a:tcPr/>
+                </a:tc>
+                <a:tc>
+                  <a:txBody>
+                    <a:bodyPr/>
+                    <a:lstStyle/>
+                    <a:p>
+                      <a:pPr algn="ctr"/>
+                      <a:r>
+                        <a:rPr lang="es-MX" dirty="0" smtClean="0"/>
+                        <a:t>27-02-15</a:t>
+                      </a:r>
+                      <a:endParaRPr lang="es-MX" dirty="0"/>
+                    </a:p>
+                  </a:txBody>
+                  <a:tcPr/>
+                </a:tc>
+                <a:tc>
+                  <a:txBody>
+                    <a:bodyPr/>
+                    <a:lstStyle/>
+                    <a:p>
+                      <a:pPr algn="ctr"/>
+                      <a:r>
+                        <a:rPr lang="es-MX" dirty="0" smtClean="0"/>
+                        <a:t>27-02-15</a:t>
+                      </a:r>
+                      <a:endParaRPr lang="es-MX" dirty="0"/>
+                    </a:p>
+                  </a:txBody>
+                  <a:tcPr/>
+                </a:tc>
+              </a:tr>
               <a:tr h="370840">
                 <a:tc>
                   <a:txBody>
@@ -8500,7 +8544,7 @@
                       <a:pPr algn="ctr"/>
                       <a:r>
                         <a:rPr lang="es-MX" dirty="0" smtClean="0"/>
-                        <a:t>Contratos Clientes</a:t>
+                        <a:t>Marzo</a:t>
                       </a:r>
                       <a:endParaRPr lang="es-MX" dirty="0"/>
                     </a:p>
@@ -8515,7 +8559,7 @@
                       <a:pPr algn="ctr"/>
                       <a:r>
                         <a:rPr lang="es-MX" dirty="0" smtClean="0"/>
-                        <a:t>16-03-15</a:t>
+                        <a:t>31-03-15</a:t>
                       </a:r>
                       <a:endParaRPr lang="es-MX" dirty="0"/>
                     </a:p>
@@ -8527,10 +8571,72 @@
                     <a:bodyPr/>
                     <a:lstStyle/>
                     <a:p>
+                      <a:pPr marL="0" marR="0" indent="0" algn="ctr" defTabSz="914400" eaLnBrk="1" fontAlgn="auto" latinLnBrk="0" hangingPunct="1">
+                        <a:lnSpc>
+                          <a:spcPct val="100000"/>
+                        </a:lnSpc>
+                        <a:spcBef>
+                          <a:spcPts val="0"/>
+                        </a:spcBef>
+                        <a:spcAft>
+                          <a:spcPts val="0"/>
+                        </a:spcAft>
+                        <a:buClrTx/>
+                        <a:buSzTx/>
+                        <a:buFontTx/>
+                        <a:buNone/>
+                        <a:tabLst/>
+                        <a:defRPr/>
+                      </a:pPr>
+                      <a:r>
+                        <a:rPr lang="es-MX" dirty="0" smtClean="0"/>
+                        <a:t>31-03-15</a:t>
+                      </a:r>
+                    </a:p>
+                  </a:txBody>
+                  <a:tcPr/>
+                </a:tc>
+              </a:tr>
+              <a:tr h="370840">
+                <a:tc>
+                  <a:txBody>
+                    <a:bodyPr/>
+                    <a:lstStyle/>
+                    <a:p>
                       <a:pPr algn="ctr"/>
                       <a:r>
                         <a:rPr lang="es-MX" dirty="0" smtClean="0"/>
-                        <a:t>01-04-15</a:t>
+                        <a:t>Abril</a:t>
+                      </a:r>
+                      <a:endParaRPr lang="es-MX" dirty="0"/>
+                    </a:p>
+                  </a:txBody>
+                  <a:tcPr/>
+                </a:tc>
+                <a:tc>
+                  <a:txBody>
+                    <a:bodyPr/>
+                    <a:lstStyle/>
+                    <a:p>
+                      <a:pPr algn="ctr"/>
+                      <a:r>
+                        <a:rPr lang="es-MX" dirty="0" smtClean="0"/>
+                        <a:t>30-04-15</a:t>
+                      </a:r>
+                      <a:endParaRPr lang="es-MX" dirty="0"/>
+                    </a:p>
+                  </a:txBody>
+                  <a:tcPr/>
+                </a:tc>
+                <a:tc>
+                  <a:txBody>
+                    <a:bodyPr/>
+                    <a:lstStyle/>
+                    <a:p>
+                      <a:pPr algn="ctr"/>
+                      <a:r>
+                        <a:rPr lang="es-MX" dirty="0" smtClean="0"/>
+                        <a:t>30-04-15</a:t>
                       </a:r>
                       <a:endParaRPr lang="es-MX" dirty="0"/>
                     </a:p>

</xml_diff>